<commit_message>
[SORT][BACKUP][DEVDOCS] Updated sequence diagrams for sort and backup commands
</commit_message>
<xml_diff>
--- a/docs/diagrams/BackupCommandDiagrams.pptx
+++ b/docs/diagrams/BackupCommandDiagrams.pptx
@@ -198,7 +198,7 @@
           <a:p>
             <a:fld id="{756A9B74-E80F-5C4E-A7DD-E49C20F7C5ED}" type="datetimeFigureOut">
               <a:rPr lang="en-US" smtClean="0"/>
-              <a:t>10/22/17</a:t>
+              <a:t>10/29/17</a:t>
             </a:fld>
             <a:endParaRPr lang="en-US"/>
           </a:p>
@@ -681,7 +681,7 @@
           <a:p>
             <a:fld id="{4C707D6F-0D04-EC44-A702-F7C7F0C5C2B0}" type="datetimeFigureOut">
               <a:rPr lang="en-US" smtClean="0"/>
-              <a:t>10/22/17</a:t>
+              <a:t>10/29/17</a:t>
             </a:fld>
             <a:endParaRPr lang="en-US"/>
           </a:p>
@@ -846,7 +846,7 @@
           <a:p>
             <a:fld id="{4C707D6F-0D04-EC44-A702-F7C7F0C5C2B0}" type="datetimeFigureOut">
               <a:rPr lang="en-US" smtClean="0"/>
-              <a:t>10/22/17</a:t>
+              <a:t>10/29/17</a:t>
             </a:fld>
             <a:endParaRPr lang="en-US"/>
           </a:p>
@@ -1021,7 +1021,7 @@
           <a:p>
             <a:fld id="{4C707D6F-0D04-EC44-A702-F7C7F0C5C2B0}" type="datetimeFigureOut">
               <a:rPr lang="en-US" smtClean="0"/>
-              <a:t>10/22/17</a:t>
+              <a:t>10/29/17</a:t>
             </a:fld>
             <a:endParaRPr lang="en-US"/>
           </a:p>
@@ -1186,7 +1186,7 @@
           <a:p>
             <a:fld id="{4C707D6F-0D04-EC44-A702-F7C7F0C5C2B0}" type="datetimeFigureOut">
               <a:rPr lang="en-US" smtClean="0"/>
-              <a:t>10/22/17</a:t>
+              <a:t>10/29/17</a:t>
             </a:fld>
             <a:endParaRPr lang="en-US"/>
           </a:p>
@@ -1427,7 +1427,7 @@
           <a:p>
             <a:fld id="{4C707D6F-0D04-EC44-A702-F7C7F0C5C2B0}" type="datetimeFigureOut">
               <a:rPr lang="en-US" smtClean="0"/>
-              <a:t>10/22/17</a:t>
+              <a:t>10/29/17</a:t>
             </a:fld>
             <a:endParaRPr lang="en-US"/>
           </a:p>
@@ -1654,7 +1654,7 @@
           <a:p>
             <a:fld id="{4C707D6F-0D04-EC44-A702-F7C7F0C5C2B0}" type="datetimeFigureOut">
               <a:rPr lang="en-US" smtClean="0"/>
-              <a:t>10/22/17</a:t>
+              <a:t>10/29/17</a:t>
             </a:fld>
             <a:endParaRPr lang="en-US"/>
           </a:p>
@@ -2016,7 +2016,7 @@
           <a:p>
             <a:fld id="{4C707D6F-0D04-EC44-A702-F7C7F0C5C2B0}" type="datetimeFigureOut">
               <a:rPr lang="en-US" smtClean="0"/>
-              <a:t>10/22/17</a:t>
+              <a:t>10/29/17</a:t>
             </a:fld>
             <a:endParaRPr lang="en-US"/>
           </a:p>
@@ -2129,7 +2129,7 @@
           <a:p>
             <a:fld id="{4C707D6F-0D04-EC44-A702-F7C7F0C5C2B0}" type="datetimeFigureOut">
               <a:rPr lang="en-US" smtClean="0"/>
-              <a:t>10/22/17</a:t>
+              <a:t>10/29/17</a:t>
             </a:fld>
             <a:endParaRPr lang="en-US"/>
           </a:p>
@@ -2219,7 +2219,7 @@
           <a:p>
             <a:fld id="{4C707D6F-0D04-EC44-A702-F7C7F0C5C2B0}" type="datetimeFigureOut">
               <a:rPr lang="en-US" smtClean="0"/>
-              <a:t>10/22/17</a:t>
+              <a:t>10/29/17</a:t>
             </a:fld>
             <a:endParaRPr lang="en-US"/>
           </a:p>
@@ -2491,7 +2491,7 @@
           <a:p>
             <a:fld id="{4C707D6F-0D04-EC44-A702-F7C7F0C5C2B0}" type="datetimeFigureOut">
               <a:rPr lang="en-US" smtClean="0"/>
-              <a:t>10/22/17</a:t>
+              <a:t>10/29/17</a:t>
             </a:fld>
             <a:endParaRPr lang="en-US"/>
           </a:p>
@@ -2743,7 +2743,7 @@
           <a:p>
             <a:fld id="{4C707D6F-0D04-EC44-A702-F7C7F0C5C2B0}" type="datetimeFigureOut">
               <a:rPr lang="en-US" smtClean="0"/>
-              <a:t>10/22/17</a:t>
+              <a:t>10/29/17</a:t>
             </a:fld>
             <a:endParaRPr lang="en-US"/>
           </a:p>
@@ -2951,7 +2951,7 @@
           <a:p>
             <a:fld id="{4C707D6F-0D04-EC44-A702-F7C7F0C5C2B0}" type="datetimeFigureOut">
               <a:rPr lang="en-US" smtClean="0"/>
-              <a:t>10/22/17</a:t>
+              <a:t>10/29/17</a:t>
             </a:fld>
             <a:endParaRPr lang="en-US"/>
           </a:p>
@@ -3356,6 +3356,42 @@
           <a:chExt cx="0" cy="0"/>
         </a:xfrm>
       </p:grpSpPr>
+      <p:cxnSp>
+        <p:nvCxnSpPr>
+          <p:cNvPr id="33" name="Straight Connector 32"/>
+          <p:cNvCxnSpPr/>
+          <p:nvPr/>
+        </p:nvCxnSpPr>
+        <p:spPr>
+          <a:xfrm flipH="1">
+            <a:off x="9168318" y="1791116"/>
+            <a:ext cx="8926" cy="4833924"/>
+          </a:xfrm>
+          <a:prstGeom prst="line">
+            <a:avLst/>
+          </a:prstGeom>
+          <a:ln>
+            <a:solidFill>
+              <a:srgbClr val="00B050"/>
+            </a:solidFill>
+            <a:prstDash val="dash"/>
+          </a:ln>
+        </p:spPr>
+        <p:style>
+          <a:lnRef idx="1">
+            <a:schemeClr val="accent1"/>
+          </a:lnRef>
+          <a:fillRef idx="0">
+            <a:schemeClr val="accent1"/>
+          </a:fillRef>
+          <a:effectRef idx="0">
+            <a:schemeClr val="accent1"/>
+          </a:effectRef>
+          <a:fontRef idx="minor">
+            <a:schemeClr val="tx1"/>
+          </a:fontRef>
+        </p:style>
+      </p:cxnSp>
       <p:sp>
         <p:nvSpPr>
           <p:cNvPr id="4" name="TextBox 3"/>
@@ -3414,8 +3450,8 @@
         </p:nvSpPr>
         <p:spPr>
           <a:xfrm>
-            <a:off x="7430865" y="1564947"/>
-            <a:ext cx="1801327" cy="369332"/>
+            <a:off x="10885340" y="528095"/>
+            <a:ext cx="1027589" cy="646331"/>
           </a:xfrm>
           <a:prstGeom prst="rect">
             <a:avLst/>
@@ -3445,12 +3481,15 @@
           <a:p>
             <a:pPr algn="ctr"/>
             <a:r>
+              <a:rPr lang="en-US" smtClean="0"/>
+              <a:t>:Storage</a:t>
+            </a:r>
+          </a:p>
+          <a:p>
+            <a:pPr algn="ctr"/>
+            <a:r>
               <a:rPr lang="en-US" dirty="0" smtClean="0"/>
-              <a:t>:</a:t>
-            </a:r>
-            <a:r>
-              <a:rPr lang="en-US" dirty="0" err="1" smtClean="0"/>
-              <a:t>StorageManager</a:t>
+              <a:t>Manager</a:t>
             </a:r>
             <a:endParaRPr lang="en-US" dirty="0"/>
           </a:p>
@@ -3516,8 +3555,8 @@
         </p:nvSpPr>
         <p:spPr>
           <a:xfrm>
-            <a:off x="5175371" y="1261651"/>
-            <a:ext cx="1893916" cy="369332"/>
+            <a:off x="8591878" y="1565116"/>
+            <a:ext cx="1152880" cy="646331"/>
           </a:xfrm>
           <a:prstGeom prst="rect">
             <a:avLst/>
@@ -3548,11 +3587,14 @@
             <a:pPr algn="ctr"/>
             <a:r>
               <a:rPr lang="en-US" dirty="0" smtClean="0"/>
-              <a:t>:</a:t>
-            </a:r>
-            <a:r>
-              <a:rPr lang="en-US" dirty="0" err="1" smtClean="0"/>
-              <a:t>BackupCommand</a:t>
+              <a:t>:Backup</a:t>
+            </a:r>
+          </a:p>
+          <a:p>
+            <a:pPr algn="ctr"/>
+            <a:r>
+              <a:rPr lang="en-US" dirty="0" smtClean="0"/>
+              <a:t>Command</a:t>
             </a:r>
             <a:endParaRPr lang="en-US" dirty="0"/>
           </a:p>
@@ -3702,11 +3744,7 @@
             <a:pPr algn="ctr"/>
             <a:r>
               <a:rPr lang="en-US" sz="1000" dirty="0" smtClean="0"/>
-              <a:t>execute</a:t>
-            </a:r>
-            <a:r>
-              <a:rPr lang="en-US" sz="1000" dirty="0" smtClean="0"/>
-              <a:t>(“backup</a:t>
+              <a:t>execute(“backup</a:t>
             </a:r>
           </a:p>
           <a:p>
@@ -3721,11 +3759,7 @@
             </a:r>
             <a:r>
               <a:rPr lang="en-US" sz="1000" dirty="0" smtClean="0"/>
-              <a:t>]</a:t>
-            </a:r>
-            <a:r>
-              <a:rPr lang="en-US" sz="1000" dirty="0" smtClean="0"/>
-              <a:t>”)</a:t>
+              <a:t>]”)</a:t>
             </a:r>
             <a:endParaRPr lang="en-US" sz="1000" dirty="0"/>
           </a:p>
@@ -3740,7 +3774,7 @@
         <p:spPr>
           <a:xfrm>
             <a:off x="4096906" y="933193"/>
-            <a:ext cx="0" cy="1644103"/>
+            <a:ext cx="0" cy="5506001"/>
           </a:xfrm>
           <a:prstGeom prst="line">
             <a:avLst/>
@@ -3773,7 +3807,7 @@
         <p:spPr>
           <a:xfrm>
             <a:off x="3991182" y="1349123"/>
-            <a:ext cx="206102" cy="959949"/>
+            <a:ext cx="227904" cy="3722749"/>
           </a:xfrm>
           <a:prstGeom prst="rect">
             <a:avLst/>
@@ -3888,47 +3922,92 @@
           </a:p>
         </p:txBody>
       </p:sp>
+      <p:sp>
+        <p:nvSpPr>
+          <p:cNvPr id="32" name="TextBox 31"/>
+          <p:cNvSpPr txBox="1"/>
+          <p:nvPr/>
+        </p:nvSpPr>
+        <p:spPr>
+          <a:xfrm>
+            <a:off x="4422703" y="1310036"/>
+            <a:ext cx="2119491" cy="246221"/>
+          </a:xfrm>
+          <a:prstGeom prst="rect">
+            <a:avLst/>
+          </a:prstGeom>
+          <a:noFill/>
+        </p:spPr>
+        <p:txBody>
+          <a:bodyPr wrap="none" rtlCol="0">
+            <a:spAutoFit/>
+          </a:bodyPr>
+          <a:lstStyle/>
+          <a:p>
+            <a:pPr algn="ctr"/>
+            <a:r>
+              <a:rPr lang="en-US" sz="1000" dirty="0" err="1" smtClean="0"/>
+              <a:t>BackupCommandParser</a:t>
+            </a:r>
+            <a:r>
+              <a:rPr lang="en-US" sz="1000" dirty="0" smtClean="0"/>
+              <a:t>().parse(</a:t>
+            </a:r>
+            <a:r>
+              <a:rPr lang="en-US" sz="1000" dirty="0" err="1" smtClean="0"/>
+              <a:t>args</a:t>
+            </a:r>
+            <a:r>
+              <a:rPr lang="en-US" sz="1000" dirty="0" smtClean="0"/>
+              <a:t>)</a:t>
+            </a:r>
+            <a:endParaRPr lang="en-US" sz="1000" dirty="0"/>
+          </a:p>
+        </p:txBody>
+      </p:sp>
       <p:cxnSp>
         <p:nvCxnSpPr>
-          <p:cNvPr id="26" name="Straight Connector 25"/>
+          <p:cNvPr id="34" name="Straight Arrow Connector 33"/>
           <p:cNvCxnSpPr/>
           <p:nvPr/>
         </p:nvCxnSpPr>
         <p:spPr>
           <a:xfrm>
-            <a:off x="6108874" y="1692981"/>
-            <a:ext cx="0" cy="4932059"/>
-          </a:xfrm>
-          <a:prstGeom prst="line">
-            <a:avLst/>
-          </a:prstGeom>
-          <a:ln/>
+            <a:off x="4199595" y="1546769"/>
+            <a:ext cx="2541008" cy="0"/>
+          </a:xfrm>
+          <a:prstGeom prst="straightConnector1">
+            <a:avLst/>
+          </a:prstGeom>
+          <a:ln>
+            <a:tailEnd type="triangle"/>
+          </a:ln>
         </p:spPr>
         <p:style>
-          <a:lnRef idx="3">
-            <a:schemeClr val="lt1"/>
+          <a:lnRef idx="1">
+            <a:schemeClr val="accent1"/>
           </a:lnRef>
-          <a:fillRef idx="1">
-            <a:schemeClr val="accent4"/>
+          <a:fillRef idx="0">
+            <a:schemeClr val="accent1"/>
           </a:fillRef>
-          <a:effectRef idx="1">
-            <a:schemeClr val="accent4"/>
+          <a:effectRef idx="0">
+            <a:schemeClr val="accent1"/>
           </a:effectRef>
           <a:fontRef idx="minor">
-            <a:schemeClr val="lt1"/>
+            <a:schemeClr val="tx1"/>
           </a:fontRef>
         </p:style>
       </p:cxnSp>
       <p:sp>
         <p:nvSpPr>
-          <p:cNvPr id="27" name="Rectangle 26"/>
+          <p:cNvPr id="53" name="Rectangle 52"/>
           <p:cNvSpPr/>
           <p:nvPr/>
         </p:nvSpPr>
         <p:spPr>
           <a:xfrm>
-            <a:off x="6016811" y="1637751"/>
-            <a:ext cx="186883" cy="374226"/>
+            <a:off x="9099384" y="2411501"/>
+            <a:ext cx="192132" cy="2014195"/>
           </a:xfrm>
           <a:prstGeom prst="rect">
             <a:avLst/>
@@ -3964,66 +4043,27 @@
           </a:p>
         </p:txBody>
       </p:sp>
-      <p:sp>
-        <p:nvSpPr>
-          <p:cNvPr id="32" name="TextBox 31"/>
-          <p:cNvSpPr txBox="1"/>
-          <p:nvPr/>
-        </p:nvSpPr>
-        <p:spPr>
-          <a:xfrm>
-            <a:off x="4093023" y="1038900"/>
-            <a:ext cx="1133645" cy="246221"/>
-          </a:xfrm>
-          <a:prstGeom prst="rect">
-            <a:avLst/>
-          </a:prstGeom>
-          <a:noFill/>
-        </p:spPr>
-        <p:txBody>
-          <a:bodyPr wrap="none" rtlCol="0">
-            <a:spAutoFit/>
-          </a:bodyPr>
-          <a:lstStyle/>
-          <a:p>
-            <a:pPr algn="ctr"/>
-            <a:r>
-              <a:rPr lang="en-US" sz="1000" dirty="0" smtClean="0"/>
-              <a:t>parse</a:t>
-            </a:r>
-            <a:r>
-              <a:rPr lang="en-US" sz="1000" smtClean="0"/>
-              <a:t>(“[</a:t>
-            </a:r>
-            <a:r>
-              <a:rPr lang="en-US" sz="1000" dirty="0" err="1" smtClean="0"/>
-              <a:t>filepath</a:t>
-            </a:r>
-            <a:r>
-              <a:rPr lang="en-US" sz="1000" dirty="0" smtClean="0"/>
-              <a:t>]”)</a:t>
-            </a:r>
-            <a:endParaRPr lang="en-US" sz="1000" dirty="0"/>
-          </a:p>
-        </p:txBody>
-      </p:sp>
       <p:cxnSp>
         <p:nvCxnSpPr>
-          <p:cNvPr id="34" name="Straight Arrow Connector 33"/>
+          <p:cNvPr id="59" name="Straight Arrow Connector 58"/>
           <p:cNvCxnSpPr>
-            <a:endCxn id="7" idx="1"/>
+            <a:stCxn id="53" idx="2"/>
           </p:cNvCxnSpPr>
           <p:nvPr/>
         </p:nvCxnSpPr>
         <p:spPr>
-          <a:xfrm>
-            <a:off x="4197284" y="1446317"/>
-            <a:ext cx="978087" cy="0"/>
+          <a:xfrm flipH="1" flipV="1">
+            <a:off x="6925255" y="4422594"/>
+            <a:ext cx="2270195" cy="3102"/>
           </a:xfrm>
           <a:prstGeom prst="straightConnector1">
             <a:avLst/>
           </a:prstGeom>
           <a:ln>
+            <a:solidFill>
+              <a:srgbClr val="92D050"/>
+            </a:solidFill>
+            <a:prstDash val="dash"/>
             <a:tailEnd type="triangle"/>
           </a:ln>
         </p:spPr>
@@ -4042,16 +4082,314 @@
           </a:fontRef>
         </p:style>
       </p:cxnSp>
-      <p:sp>
-        <p:nvSpPr>
-          <p:cNvPr id="53" name="Rectangle 52"/>
+      <p:cxnSp>
+        <p:nvCxnSpPr>
+          <p:cNvPr id="64" name="Straight Connector 63"/>
+          <p:cNvCxnSpPr>
+            <a:stCxn id="5" idx="2"/>
+          </p:cNvCxnSpPr>
+          <p:nvPr/>
+        </p:nvCxnSpPr>
+        <p:spPr>
+          <a:xfrm flipH="1">
+            <a:off x="11388561" y="1174426"/>
+            <a:ext cx="10574" cy="5450614"/>
+          </a:xfrm>
+          <a:prstGeom prst="line">
+            <a:avLst/>
+          </a:prstGeom>
+          <a:ln>
+            <a:solidFill>
+              <a:schemeClr val="tx1"/>
+            </a:solidFill>
+            <a:prstDash val="dash"/>
+          </a:ln>
+        </p:spPr>
+        <p:style>
+          <a:lnRef idx="1">
+            <a:schemeClr val="accent1"/>
+          </a:lnRef>
+          <a:fillRef idx="0">
+            <a:schemeClr val="accent1"/>
+          </a:fillRef>
+          <a:effectRef idx="0">
+            <a:schemeClr val="accent1"/>
+          </a:effectRef>
+          <a:fontRef idx="minor">
+            <a:schemeClr val="tx1"/>
+          </a:fontRef>
+        </p:style>
+      </p:cxnSp>
+      <p:sp>
+        <p:nvSpPr>
+          <p:cNvPr id="69" name="Rectangle 68"/>
           <p:cNvSpPr/>
           <p:nvPr/>
         </p:nvSpPr>
         <p:spPr>
           <a:xfrm>
-            <a:off x="6027295" y="2840234"/>
-            <a:ext cx="176399" cy="3345894"/>
+            <a:off x="11300360" y="3155943"/>
+            <a:ext cx="197551" cy="2652233"/>
+          </a:xfrm>
+          <a:prstGeom prst="rect">
+            <a:avLst/>
+          </a:prstGeom>
+        </p:spPr>
+        <p:style>
+          <a:lnRef idx="2">
+            <a:schemeClr val="dk1">
+              <a:shade val="50000"/>
+            </a:schemeClr>
+          </a:lnRef>
+          <a:fillRef idx="1">
+            <a:schemeClr val="dk1"/>
+          </a:fillRef>
+          <a:effectRef idx="0">
+            <a:schemeClr val="dk1"/>
+          </a:effectRef>
+          <a:fontRef idx="minor">
+            <a:schemeClr val="lt1"/>
+          </a:fontRef>
+        </p:style>
+        <p:txBody>
+          <a:bodyPr rot="0" spcFirstLastPara="0" vertOverflow="overflow" horzOverflow="overflow" vert="horz" wrap="square" lIns="91440" tIns="45720" rIns="91440" bIns="45720" numCol="1" spcCol="0" rtlCol="0" fromWordArt="0" anchor="ctr" anchorCtr="0" forceAA="0" compatLnSpc="1">
+            <a:prstTxWarp prst="textNoShape">
+              <a:avLst/>
+            </a:prstTxWarp>
+            <a:noAutofit/>
+          </a:bodyPr>
+          <a:lstStyle/>
+          <a:p>
+            <a:pPr algn="ctr"/>
+            <a:endParaRPr lang="en-US"/>
+          </a:p>
+        </p:txBody>
+      </p:sp>
+      <p:cxnSp>
+        <p:nvCxnSpPr>
+          <p:cNvPr id="71" name="Straight Arrow Connector 70"/>
+          <p:cNvCxnSpPr/>
+          <p:nvPr/>
+        </p:nvCxnSpPr>
+        <p:spPr>
+          <a:xfrm>
+            <a:off x="9275783" y="3180327"/>
+            <a:ext cx="2039632" cy="0"/>
+          </a:xfrm>
+          <a:prstGeom prst="straightConnector1">
+            <a:avLst/>
+          </a:prstGeom>
+          <a:ln>
+            <a:tailEnd type="triangle"/>
+          </a:ln>
+        </p:spPr>
+        <p:style>
+          <a:lnRef idx="1">
+            <a:schemeClr val="accent1"/>
+          </a:lnRef>
+          <a:fillRef idx="0">
+            <a:schemeClr val="accent1"/>
+          </a:fillRef>
+          <a:effectRef idx="0">
+            <a:schemeClr val="accent1"/>
+          </a:effectRef>
+          <a:fontRef idx="minor">
+            <a:schemeClr val="tx1"/>
+          </a:fontRef>
+        </p:style>
+      </p:cxnSp>
+      <p:sp>
+        <p:nvSpPr>
+          <p:cNvPr id="72" name="TextBox 71"/>
+          <p:cNvSpPr txBox="1"/>
+          <p:nvPr/>
+        </p:nvSpPr>
+        <p:spPr>
+          <a:xfrm>
+            <a:off x="9632056" y="2980272"/>
+            <a:ext cx="1385315" cy="400110"/>
+          </a:xfrm>
+          <a:prstGeom prst="rect">
+            <a:avLst/>
+          </a:prstGeom>
+          <a:noFill/>
+        </p:spPr>
+        <p:txBody>
+          <a:bodyPr wrap="none" rtlCol="0">
+            <a:spAutoFit/>
+          </a:bodyPr>
+          <a:lstStyle/>
+          <a:p>
+            <a:pPr algn="ctr"/>
+            <a:r>
+              <a:rPr lang="en-US" sz="1000" dirty="0" err="1" smtClean="0"/>
+              <a:t>backupAddressBook</a:t>
+            </a:r>
+            <a:r>
+              <a:rPr lang="en-US" sz="1000" dirty="0" smtClean="0"/>
+              <a:t> </a:t>
+            </a:r>
+          </a:p>
+          <a:p>
+            <a:pPr algn="ctr"/>
+            <a:r>
+              <a:rPr lang="en-US" sz="1000" dirty="0" smtClean="0"/>
+              <a:t>(</a:t>
+            </a:r>
+            <a:r>
+              <a:rPr lang="en-US" sz="1000" dirty="0" err="1" smtClean="0"/>
+              <a:t>addressbook</a:t>
+            </a:r>
+            <a:r>
+              <a:rPr lang="en-US" sz="1000" dirty="0" smtClean="0"/>
+              <a:t>, </a:t>
+            </a:r>
+            <a:r>
+              <a:rPr lang="en-US" sz="1000" dirty="0" err="1" smtClean="0"/>
+              <a:t>filepath</a:t>
+            </a:r>
+            <a:r>
+              <a:rPr lang="en-US" sz="1000" dirty="0" smtClean="0"/>
+              <a:t>)</a:t>
+            </a:r>
+            <a:endParaRPr lang="en-US" sz="1000" dirty="0"/>
+          </a:p>
+        </p:txBody>
+      </p:sp>
+      <p:sp>
+        <p:nvSpPr>
+          <p:cNvPr id="3" name="Rectangle 2"/>
+          <p:cNvSpPr/>
+          <p:nvPr/>
+        </p:nvSpPr>
+        <p:spPr>
+          <a:xfrm>
+            <a:off x="110210" y="115980"/>
+            <a:ext cx="11923293" cy="6632292"/>
+          </a:xfrm>
+          <a:prstGeom prst="rect">
+            <a:avLst/>
+          </a:prstGeom>
+          <a:noFill/>
+        </p:spPr>
+        <p:style>
+          <a:lnRef idx="2">
+            <a:schemeClr val="accent1">
+              <a:shade val="50000"/>
+            </a:schemeClr>
+          </a:lnRef>
+          <a:fillRef idx="1">
+            <a:schemeClr val="accent1"/>
+          </a:fillRef>
+          <a:effectRef idx="0">
+            <a:schemeClr val="accent1"/>
+          </a:effectRef>
+          <a:fontRef idx="minor">
+            <a:schemeClr val="lt1"/>
+          </a:fontRef>
+        </p:style>
+        <p:txBody>
+          <a:bodyPr rtlCol="0" anchor="ctr"/>
+          <a:lstStyle/>
+          <a:p>
+            <a:pPr algn="ctr"/>
+            <a:endParaRPr lang="en-US" dirty="0"/>
+          </a:p>
+        </p:txBody>
+      </p:sp>
+      <p:sp>
+        <p:nvSpPr>
+          <p:cNvPr id="9" name="TextBox 8"/>
+          <p:cNvSpPr txBox="1"/>
+          <p:nvPr/>
+        </p:nvSpPr>
+        <p:spPr>
+          <a:xfrm>
+            <a:off x="116793" y="114135"/>
+            <a:ext cx="2660344" cy="369332"/>
+          </a:xfrm>
+          <a:prstGeom prst="rect">
+            <a:avLst/>
+          </a:prstGeom>
+        </p:spPr>
+        <p:style>
+          <a:lnRef idx="2">
+            <a:schemeClr val="accent1"/>
+          </a:lnRef>
+          <a:fillRef idx="1">
+            <a:schemeClr val="lt1"/>
+          </a:fillRef>
+          <a:effectRef idx="0">
+            <a:schemeClr val="accent1"/>
+          </a:effectRef>
+          <a:fontRef idx="minor">
+            <a:schemeClr val="dk1"/>
+          </a:fontRef>
+        </p:style>
+        <p:txBody>
+          <a:bodyPr wrap="none" rtlCol="0">
+            <a:spAutoFit/>
+          </a:bodyPr>
+          <a:lstStyle/>
+          <a:p>
+            <a:r>
+              <a:rPr lang="en-US" dirty="0" smtClean="0"/>
+              <a:t>Backup Sequence</a:t>
+            </a:r>
+            <a:r>
+              <a:rPr lang="en-US" smtClean="0"/>
+              <a:t>: Custom</a:t>
+            </a:r>
+            <a:endParaRPr lang="en-US" dirty="0"/>
+          </a:p>
+        </p:txBody>
+      </p:sp>
+      <p:cxnSp>
+        <p:nvCxnSpPr>
+          <p:cNvPr id="39" name="Straight Connector 38"/>
+          <p:cNvCxnSpPr/>
+          <p:nvPr/>
+        </p:nvCxnSpPr>
+        <p:spPr>
+          <a:xfrm>
+            <a:off x="6830419" y="1230000"/>
+            <a:ext cx="0" cy="4956128"/>
+          </a:xfrm>
+          <a:prstGeom prst="line">
+            <a:avLst/>
+          </a:prstGeom>
+          <a:ln>
+            <a:solidFill>
+              <a:srgbClr val="00B050"/>
+            </a:solidFill>
+            <a:prstDash val="dash"/>
+          </a:ln>
+        </p:spPr>
+        <p:style>
+          <a:lnRef idx="1">
+            <a:schemeClr val="accent1"/>
+          </a:lnRef>
+          <a:fillRef idx="0">
+            <a:schemeClr val="accent1"/>
+          </a:fillRef>
+          <a:effectRef idx="0">
+            <a:schemeClr val="accent1"/>
+          </a:effectRef>
+          <a:fontRef idx="minor">
+            <a:schemeClr val="tx1"/>
+          </a:fontRef>
+        </p:style>
+      </p:cxnSp>
+      <p:sp>
+        <p:nvSpPr>
+          <p:cNvPr id="40" name="TextBox 39"/>
+          <p:cNvSpPr txBox="1"/>
+          <p:nvPr/>
+        </p:nvSpPr>
+        <p:spPr>
+          <a:xfrm>
+            <a:off x="5988870" y="583669"/>
+            <a:ext cx="1738809" cy="646331"/>
           </a:xfrm>
           <a:prstGeom prst="rect">
             <a:avLst/>
@@ -4074,72 +4412,6 @@
           </a:fontRef>
         </p:style>
         <p:txBody>
-          <a:bodyPr rot="0" spcFirstLastPara="0" vertOverflow="overflow" horzOverflow="overflow" vert="horz" wrap="square" lIns="91440" tIns="45720" rIns="91440" bIns="45720" numCol="1" spcCol="0" rtlCol="0" fromWordArt="0" anchor="ctr" anchorCtr="0" forceAA="0" compatLnSpc="1">
-            <a:prstTxWarp prst="textNoShape">
-              <a:avLst/>
-            </a:prstTxWarp>
-            <a:noAutofit/>
-          </a:bodyPr>
-          <a:lstStyle/>
-          <a:p>
-            <a:pPr algn="ctr"/>
-            <a:endParaRPr lang="en-US"/>
-          </a:p>
-        </p:txBody>
-      </p:sp>
-      <p:cxnSp>
-        <p:nvCxnSpPr>
-          <p:cNvPr id="54" name="Straight Arrow Connector 53"/>
-          <p:cNvCxnSpPr/>
-          <p:nvPr/>
-        </p:nvCxnSpPr>
-        <p:spPr>
-          <a:xfrm flipV="1">
-            <a:off x="1807614" y="2901147"/>
-            <a:ext cx="4209197" cy="32959"/>
-          </a:xfrm>
-          <a:prstGeom prst="straightConnector1">
-            <a:avLst/>
-          </a:prstGeom>
-          <a:ln>
-            <a:solidFill>
-              <a:schemeClr val="accent2"/>
-            </a:solidFill>
-            <a:tailEnd type="triangle"/>
-          </a:ln>
-        </p:spPr>
-        <p:style>
-          <a:lnRef idx="1">
-            <a:schemeClr val="accent1"/>
-          </a:lnRef>
-          <a:fillRef idx="0">
-            <a:schemeClr val="accent1"/>
-          </a:fillRef>
-          <a:effectRef idx="0">
-            <a:schemeClr val="accent1"/>
-          </a:effectRef>
-          <a:fontRef idx="minor">
-            <a:schemeClr val="tx1"/>
-          </a:fontRef>
-        </p:style>
-      </p:cxnSp>
-      <p:sp>
-        <p:nvSpPr>
-          <p:cNvPr id="55" name="TextBox 54"/>
-          <p:cNvSpPr txBox="1"/>
-          <p:nvPr/>
-        </p:nvSpPr>
-        <p:spPr>
-          <a:xfrm>
-            <a:off x="3598885" y="2705301"/>
-            <a:ext cx="673582" cy="246221"/>
-          </a:xfrm>
-          <a:prstGeom prst="rect">
-            <a:avLst/>
-          </a:prstGeom>
-          <a:noFill/>
-        </p:spPr>
-        <p:txBody>
           <a:bodyPr wrap="none" rtlCol="0">
             <a:spAutoFit/>
           </a:bodyPr>
@@ -4147,69 +4419,34 @@
           <a:p>
             <a:pPr algn="ctr"/>
             <a:r>
-              <a:rPr lang="en-US" sz="1000" dirty="0" smtClean="0"/>
-              <a:t>execute()</a:t>
-            </a:r>
-            <a:endParaRPr lang="en-US" sz="1000" dirty="0"/>
-          </a:p>
-        </p:txBody>
-      </p:sp>
-      <p:cxnSp>
-        <p:nvCxnSpPr>
-          <p:cNvPr id="59" name="Straight Arrow Connector 58"/>
-          <p:cNvCxnSpPr/>
+              <a:rPr lang="en-US" dirty="0" smtClean="0"/>
+              <a:t>:Backup</a:t>
+            </a:r>
+          </a:p>
+          <a:p>
+            <a:pPr algn="ctr"/>
+            <a:r>
+              <a:rPr lang="en-US" dirty="0" err="1" smtClean="0"/>
+              <a:t>CommandParser</a:t>
+            </a:r>
+            <a:endParaRPr lang="en-US" dirty="0"/>
+          </a:p>
+        </p:txBody>
+      </p:sp>
+      <p:sp>
+        <p:nvSpPr>
+          <p:cNvPr id="41" name="Rectangle 40"/>
+          <p:cNvSpPr/>
           <p:nvPr/>
-        </p:nvCxnSpPr>
-        <p:spPr>
-          <a:xfrm flipH="1">
-            <a:off x="1782501" y="6186128"/>
-            <a:ext cx="4244794" cy="17902"/>
-          </a:xfrm>
-          <a:prstGeom prst="straightConnector1">
-            <a:avLst/>
-          </a:prstGeom>
-          <a:ln>
-            <a:solidFill>
-              <a:srgbClr val="92D050"/>
-            </a:solidFill>
-            <a:prstDash val="dash"/>
-            <a:tailEnd type="triangle"/>
-          </a:ln>
-        </p:spPr>
-        <p:style>
-          <a:lnRef idx="1">
-            <a:schemeClr val="accent1"/>
-          </a:lnRef>
-          <a:fillRef idx="0">
-            <a:schemeClr val="accent1"/>
-          </a:fillRef>
-          <a:effectRef idx="0">
-            <a:schemeClr val="accent1"/>
-          </a:effectRef>
-          <a:fontRef idx="minor">
-            <a:schemeClr val="tx1"/>
-          </a:fontRef>
-        </p:style>
-      </p:cxnSp>
-      <p:cxnSp>
-        <p:nvCxnSpPr>
-          <p:cNvPr id="62" name="Straight Arrow Connector 61"/>
-          <p:cNvCxnSpPr>
-            <a:stCxn id="27" idx="2"/>
-          </p:cNvCxnSpPr>
-          <p:nvPr/>
-        </p:nvCxnSpPr>
-        <p:spPr>
-          <a:xfrm flipH="1">
-            <a:off x="4193728" y="2011977"/>
-            <a:ext cx="1916525" cy="0"/>
-          </a:xfrm>
-          <a:prstGeom prst="straightConnector1">
-            <a:avLst/>
-          </a:prstGeom>
-          <a:ln>
-            <a:tailEnd type="triangle"/>
-          </a:ln>
+        </p:nvSpPr>
+        <p:spPr>
+          <a:xfrm>
+            <a:off x="6715412" y="1532366"/>
+            <a:ext cx="209843" cy="3076210"/>
+          </a:xfrm>
+          <a:prstGeom prst="rect">
+            <a:avLst/>
+          </a:prstGeom>
         </p:spPr>
         <p:style>
           <a:lnRef idx="2">
@@ -4227,57 +4464,36 @@
             <a:schemeClr val="lt1"/>
           </a:fontRef>
         </p:style>
-      </p:cxnSp>
-      <p:sp>
-        <p:nvSpPr>
-          <p:cNvPr id="63" name="TextBox 62"/>
-          <p:cNvSpPr txBox="1"/>
-          <p:nvPr/>
-        </p:nvSpPr>
-        <p:spPr>
-          <a:xfrm>
-            <a:off x="3851611" y="5939907"/>
-            <a:ext cx="482824" cy="246221"/>
-          </a:xfrm>
-          <a:prstGeom prst="rect">
-            <a:avLst/>
-          </a:prstGeom>
-          <a:noFill/>
-        </p:spPr>
-        <p:txBody>
-          <a:bodyPr wrap="none" rtlCol="0">
-            <a:spAutoFit/>
+        <p:txBody>
+          <a:bodyPr rot="0" spcFirstLastPara="0" vertOverflow="overflow" horzOverflow="overflow" vert="horz" wrap="square" lIns="91440" tIns="45720" rIns="91440" bIns="45720" numCol="1" spcCol="0" rtlCol="0" fromWordArt="0" anchor="ctr" anchorCtr="0" forceAA="0" compatLnSpc="1">
+            <a:prstTxWarp prst="textNoShape">
+              <a:avLst/>
+            </a:prstTxWarp>
+            <a:noAutofit/>
           </a:bodyPr>
           <a:lstStyle/>
           <a:p>
             <a:pPr algn="ctr"/>
-            <a:r>
-              <a:rPr lang="en-US" sz="1000" dirty="0" smtClean="0"/>
-              <a:t>result</a:t>
-            </a:r>
-            <a:endParaRPr lang="en-US" sz="1000" dirty="0"/>
+            <a:endParaRPr lang="en-US"/>
           </a:p>
         </p:txBody>
       </p:sp>
       <p:cxnSp>
         <p:nvCxnSpPr>
-          <p:cNvPr id="64" name="Straight Connector 63"/>
+          <p:cNvPr id="49" name="Straight Arrow Connector 48"/>
           <p:cNvCxnSpPr/>
           <p:nvPr/>
         </p:nvCxnSpPr>
         <p:spPr>
           <a:xfrm>
-            <a:off x="8331526" y="1934279"/>
-            <a:ext cx="0" cy="4690761"/>
-          </a:xfrm>
-          <a:prstGeom prst="line">
+            <a:off x="6925255" y="2053492"/>
+            <a:ext cx="1675366" cy="0"/>
+          </a:xfrm>
+          <a:prstGeom prst="straightConnector1">
             <a:avLst/>
           </a:prstGeom>
           <a:ln>
-            <a:solidFill>
-              <a:schemeClr val="tx1"/>
-            </a:solidFill>
-            <a:prstDash val="dash"/>
+            <a:tailEnd type="triangle"/>
           </a:ln>
         </p:spPr>
         <p:style>
@@ -4297,64 +4513,66 @@
       </p:cxnSp>
       <p:sp>
         <p:nvSpPr>
-          <p:cNvPr id="69" name="Rectangle 68"/>
-          <p:cNvSpPr/>
+          <p:cNvPr id="52" name="TextBox 51"/>
+          <p:cNvSpPr txBox="1"/>
           <p:nvPr/>
         </p:nvSpPr>
         <p:spPr>
           <a:xfrm>
-            <a:off x="8243326" y="3155943"/>
-            <a:ext cx="197551" cy="2652233"/>
+            <a:off x="6959914" y="1791115"/>
+            <a:ext cx="1576073" cy="246221"/>
           </a:xfrm>
           <a:prstGeom prst="rect">
             <a:avLst/>
           </a:prstGeom>
-        </p:spPr>
-        <p:style>
-          <a:lnRef idx="2">
-            <a:schemeClr val="dk1">
-              <a:shade val="50000"/>
-            </a:schemeClr>
-          </a:lnRef>
-          <a:fillRef idx="1">
-            <a:schemeClr val="dk1"/>
-          </a:fillRef>
-          <a:effectRef idx="0">
-            <a:schemeClr val="dk1"/>
-          </a:effectRef>
-          <a:fontRef idx="minor">
-            <a:schemeClr val="lt1"/>
-          </a:fontRef>
-        </p:style>
-        <p:txBody>
-          <a:bodyPr rot="0" spcFirstLastPara="0" vertOverflow="overflow" horzOverflow="overflow" vert="horz" wrap="square" lIns="91440" tIns="45720" rIns="91440" bIns="45720" numCol="1" spcCol="0" rtlCol="0" fromWordArt="0" anchor="ctr" anchorCtr="0" forceAA="0" compatLnSpc="1">
-            <a:prstTxWarp prst="textNoShape">
-              <a:avLst/>
-            </a:prstTxWarp>
-            <a:noAutofit/>
+          <a:noFill/>
+        </p:spPr>
+        <p:txBody>
+          <a:bodyPr wrap="none" rtlCol="0">
+            <a:spAutoFit/>
           </a:bodyPr>
           <a:lstStyle/>
           <a:p>
             <a:pPr algn="ctr"/>
-            <a:endParaRPr lang="en-US"/>
+            <a:r>
+              <a:rPr lang="en-US" sz="1000" dirty="0" err="1" smtClean="0"/>
+              <a:t>BackupCommand</a:t>
+            </a:r>
+            <a:r>
+              <a:rPr lang="en-US" sz="1000" dirty="0" smtClean="0"/>
+              <a:t>(</a:t>
+            </a:r>
+            <a:r>
+              <a:rPr lang="en-US" sz="1000" dirty="0" err="1" smtClean="0"/>
+              <a:t>filepath</a:t>
+            </a:r>
+            <a:r>
+              <a:rPr lang="en-US" sz="1000" dirty="0" smtClean="0"/>
+              <a:t>)</a:t>
+            </a:r>
+            <a:endParaRPr lang="en-US" sz="1000" dirty="0"/>
           </a:p>
         </p:txBody>
       </p:sp>
       <p:cxnSp>
         <p:nvCxnSpPr>
-          <p:cNvPr id="71" name="Straight Arrow Connector 70"/>
+          <p:cNvPr id="65" name="Straight Arrow Connector 64"/>
           <p:cNvCxnSpPr/>
           <p:nvPr/>
         </p:nvCxnSpPr>
         <p:spPr>
-          <a:xfrm>
-            <a:off x="6203694" y="3180327"/>
-            <a:ext cx="2039632" cy="0"/>
+          <a:xfrm flipH="1" flipV="1">
+            <a:off x="4216430" y="4523232"/>
+            <a:ext cx="2462411" cy="11923"/>
           </a:xfrm>
           <a:prstGeom prst="straightConnector1">
             <a:avLst/>
           </a:prstGeom>
           <a:ln>
+            <a:solidFill>
+              <a:srgbClr val="92D050"/>
+            </a:solidFill>
+            <a:prstDash val="dash"/>
             <a:tailEnd type="triangle"/>
           </a:ln>
         </p:spPr>
@@ -4373,195 +4591,43 @@
           </a:fontRef>
         </p:style>
       </p:cxnSp>
-      <p:sp>
-        <p:nvSpPr>
-          <p:cNvPr id="72" name="TextBox 71"/>
-          <p:cNvSpPr txBox="1"/>
+      <p:cxnSp>
+        <p:nvCxnSpPr>
+          <p:cNvPr id="66" name="Straight Arrow Connector 65"/>
+          <p:cNvCxnSpPr/>
           <p:nvPr/>
-        </p:nvSpPr>
-        <p:spPr>
-          <a:xfrm>
-            <a:off x="6559967" y="2980272"/>
-            <a:ext cx="1385315" cy="400110"/>
-          </a:xfrm>
-          <a:prstGeom prst="rect">
-            <a:avLst/>
-          </a:prstGeom>
-          <a:noFill/>
-        </p:spPr>
-        <p:txBody>
-          <a:bodyPr wrap="none" rtlCol="0">
-            <a:spAutoFit/>
-          </a:bodyPr>
-          <a:lstStyle/>
-          <a:p>
-            <a:pPr algn="ctr"/>
-            <a:r>
-              <a:rPr lang="en-US" sz="1000" dirty="0" err="1" smtClean="0"/>
-              <a:t>backupAddressBook</a:t>
-            </a:r>
-            <a:r>
-              <a:rPr lang="en-US" sz="1000" dirty="0" smtClean="0"/>
-              <a:t> </a:t>
-            </a:r>
-          </a:p>
-          <a:p>
-            <a:pPr algn="ctr"/>
-            <a:r>
-              <a:rPr lang="en-US" sz="1000" dirty="0" smtClean="0"/>
-              <a:t>(</a:t>
-            </a:r>
-            <a:r>
-              <a:rPr lang="en-US" sz="1000" dirty="0" err="1" smtClean="0"/>
-              <a:t>addressbook</a:t>
-            </a:r>
-            <a:r>
-              <a:rPr lang="en-US" sz="1000" dirty="0" smtClean="0"/>
-              <a:t>, </a:t>
-            </a:r>
-            <a:r>
-              <a:rPr lang="en-US" sz="1000" dirty="0" err="1" smtClean="0"/>
-              <a:t>filepath</a:t>
-            </a:r>
-            <a:r>
-              <a:rPr lang="en-US" sz="1000" dirty="0" smtClean="0"/>
-              <a:t>)</a:t>
-            </a:r>
-            <a:endParaRPr lang="en-US" sz="1000" dirty="0"/>
-          </a:p>
-        </p:txBody>
-      </p:sp>
-      <p:sp>
-        <p:nvSpPr>
-          <p:cNvPr id="3" name="Rectangle 2"/>
-          <p:cNvSpPr/>
-          <p:nvPr/>
-        </p:nvSpPr>
-        <p:spPr>
-          <a:xfrm>
-            <a:off x="110211" y="115980"/>
-            <a:ext cx="9415754" cy="6632292"/>
-          </a:xfrm>
-          <a:prstGeom prst="rect">
-            <a:avLst/>
-          </a:prstGeom>
-          <a:noFill/>
+        </p:nvCxnSpPr>
+        <p:spPr>
+          <a:xfrm flipH="1" flipV="1">
+            <a:off x="1811370" y="4986528"/>
+            <a:ext cx="2171265" cy="14404"/>
+          </a:xfrm>
+          <a:prstGeom prst="straightConnector1">
+            <a:avLst/>
+          </a:prstGeom>
+          <a:ln>
+            <a:solidFill>
+              <a:srgbClr val="92D050"/>
+            </a:solidFill>
+            <a:prstDash val="dash"/>
+            <a:tailEnd type="triangle"/>
+          </a:ln>
         </p:spPr>
         <p:style>
-          <a:lnRef idx="2">
-            <a:schemeClr val="accent1">
-              <a:shade val="50000"/>
-            </a:schemeClr>
+          <a:lnRef idx="1">
+            <a:schemeClr val="accent1"/>
           </a:lnRef>
-          <a:fillRef idx="1">
+          <a:fillRef idx="0">
             <a:schemeClr val="accent1"/>
           </a:fillRef>
           <a:effectRef idx="0">
             <a:schemeClr val="accent1"/>
           </a:effectRef>
           <a:fontRef idx="minor">
-            <a:schemeClr val="lt1"/>
+            <a:schemeClr val="tx1"/>
           </a:fontRef>
         </p:style>
-        <p:txBody>
-          <a:bodyPr rtlCol="0" anchor="ctr"/>
-          <a:lstStyle/>
-          <a:p>
-            <a:pPr algn="ctr"/>
-            <a:endParaRPr lang="en-US" dirty="0"/>
-          </a:p>
-        </p:txBody>
-      </p:sp>
-      <p:sp>
-        <p:nvSpPr>
-          <p:cNvPr id="9" name="TextBox 8"/>
-          <p:cNvSpPr txBox="1"/>
-          <p:nvPr/>
-        </p:nvSpPr>
-        <p:spPr>
-          <a:xfrm>
-            <a:off x="116793" y="114135"/>
-            <a:ext cx="2660344" cy="369332"/>
-          </a:xfrm>
-          <a:prstGeom prst="rect">
-            <a:avLst/>
-          </a:prstGeom>
-        </p:spPr>
-        <p:style>
-          <a:lnRef idx="2">
-            <a:schemeClr val="accent1"/>
-          </a:lnRef>
-          <a:fillRef idx="1">
-            <a:schemeClr val="lt1"/>
-          </a:fillRef>
-          <a:effectRef idx="0">
-            <a:schemeClr val="accent1"/>
-          </a:effectRef>
-          <a:fontRef idx="minor">
-            <a:schemeClr val="dk1"/>
-          </a:fontRef>
-        </p:style>
-        <p:txBody>
-          <a:bodyPr wrap="none" rtlCol="0">
-            <a:spAutoFit/>
-          </a:bodyPr>
-          <a:lstStyle/>
-          <a:p>
-            <a:r>
-              <a:rPr lang="en-US" dirty="0" smtClean="0"/>
-              <a:t>Backup Sequence</a:t>
-            </a:r>
-            <a:r>
-              <a:rPr lang="en-US" smtClean="0"/>
-              <a:t>: Custom</a:t>
-            </a:r>
-            <a:endParaRPr lang="en-US" dirty="0"/>
-          </a:p>
-        </p:txBody>
-      </p:sp>
-      <p:sp>
-        <p:nvSpPr>
-          <p:cNvPr id="50" name="TextBox 49"/>
-          <p:cNvSpPr txBox="1"/>
-          <p:nvPr/>
-        </p:nvSpPr>
-        <p:spPr>
-          <a:xfrm>
-            <a:off x="4278863" y="1791116"/>
-            <a:ext cx="1760418" cy="246221"/>
-          </a:xfrm>
-          <a:prstGeom prst="rect">
-            <a:avLst/>
-          </a:prstGeom>
-          <a:noFill/>
-        </p:spPr>
-        <p:txBody>
-          <a:bodyPr wrap="none" rtlCol="0">
-            <a:spAutoFit/>
-          </a:bodyPr>
-          <a:lstStyle/>
-          <a:p>
-            <a:pPr algn="ctr"/>
-            <a:r>
-              <a:rPr lang="en-US" sz="1000" dirty="0" err="1" smtClean="0"/>
-              <a:t>BackupCommand</a:t>
-            </a:r>
-            <a:r>
-              <a:rPr lang="en-US" sz="1000" dirty="0" smtClean="0"/>
-              <a:t>(”[</a:t>
-            </a:r>
-            <a:r>
-              <a:rPr lang="en-US" sz="1000" dirty="0" err="1" smtClean="0"/>
-              <a:t>filepath</a:t>
-            </a:r>
-            <a:r>
-              <a:rPr lang="en-US" sz="1000" dirty="0" smtClean="0"/>
-              <a:t>]”)</a:t>
-            </a:r>
-            <a:endParaRPr lang="en-US" sz="1000" dirty="0"/>
-          </a:p>
-        </p:txBody>
-      </p:sp>
+      </p:cxnSp>
     </p:spTree>
     <p:extLst>
       <p:ext uri="{BB962C8B-B14F-4D97-AF65-F5344CB8AC3E}">
@@ -4592,9 +4658,45 @@
           <a:chExt cx="0" cy="0"/>
         </a:xfrm>
       </p:grpSpPr>
-      <p:sp>
-        <p:nvSpPr>
-          <p:cNvPr id="4" name="TextBox 3"/>
+      <p:cxnSp>
+        <p:nvCxnSpPr>
+          <p:cNvPr id="46" name="Straight Connector 45"/>
+          <p:cNvCxnSpPr/>
+          <p:nvPr/>
+        </p:nvCxnSpPr>
+        <p:spPr>
+          <a:xfrm flipH="1">
+            <a:off x="9168318" y="1791116"/>
+            <a:ext cx="8926" cy="4833924"/>
+          </a:xfrm>
+          <a:prstGeom prst="line">
+            <a:avLst/>
+          </a:prstGeom>
+          <a:ln>
+            <a:solidFill>
+              <a:srgbClr val="00B050"/>
+            </a:solidFill>
+            <a:prstDash val="dash"/>
+          </a:ln>
+        </p:spPr>
+        <p:style>
+          <a:lnRef idx="1">
+            <a:schemeClr val="accent1"/>
+          </a:lnRef>
+          <a:fillRef idx="0">
+            <a:schemeClr val="accent1"/>
+          </a:fillRef>
+          <a:effectRef idx="0">
+            <a:schemeClr val="accent1"/>
+          </a:effectRef>
+          <a:fontRef idx="minor">
+            <a:schemeClr val="tx1"/>
+          </a:fontRef>
+        </p:style>
+      </p:cxnSp>
+      <p:sp>
+        <p:nvSpPr>
+          <p:cNvPr id="47" name="TextBox 46"/>
           <p:cNvSpPr txBox="1"/>
           <p:nvPr/>
         </p:nvSpPr>
@@ -4644,14 +4746,14 @@
       </p:sp>
       <p:sp>
         <p:nvSpPr>
-          <p:cNvPr id="5" name="TextBox 4"/>
+          <p:cNvPr id="48" name="TextBox 47"/>
           <p:cNvSpPr txBox="1"/>
           <p:nvPr/>
         </p:nvSpPr>
         <p:spPr>
           <a:xfrm>
-            <a:off x="7430865" y="1564947"/>
-            <a:ext cx="1801327" cy="369332"/>
+            <a:off x="10885340" y="528095"/>
+            <a:ext cx="1027589" cy="646331"/>
           </a:xfrm>
           <a:prstGeom prst="rect">
             <a:avLst/>
@@ -4681,12 +4783,15 @@
           <a:p>
             <a:pPr algn="ctr"/>
             <a:r>
+              <a:rPr lang="en-US" smtClean="0"/>
+              <a:t>:Storage</a:t>
+            </a:r>
+          </a:p>
+          <a:p>
+            <a:pPr algn="ctr"/>
+            <a:r>
               <a:rPr lang="en-US" dirty="0" smtClean="0"/>
-              <a:t>:</a:t>
-            </a:r>
-            <a:r>
-              <a:rPr lang="en-US" dirty="0" err="1" smtClean="0"/>
-              <a:t>StorageManager</a:t>
+              <a:t>Manager</a:t>
             </a:r>
             <a:endParaRPr lang="en-US" dirty="0"/>
           </a:p>
@@ -4694,7 +4799,7 @@
       </p:sp>
       <p:sp>
         <p:nvSpPr>
-          <p:cNvPr id="6" name="TextBox 5"/>
+          <p:cNvPr id="49" name="TextBox 48"/>
           <p:cNvSpPr txBox="1"/>
           <p:nvPr/>
         </p:nvSpPr>
@@ -4746,14 +4851,14 @@
       </p:sp>
       <p:sp>
         <p:nvSpPr>
-          <p:cNvPr id="7" name="TextBox 6"/>
+          <p:cNvPr id="50" name="TextBox 49"/>
           <p:cNvSpPr txBox="1"/>
           <p:nvPr/>
         </p:nvSpPr>
         <p:spPr>
           <a:xfrm>
-            <a:off x="5175371" y="1261651"/>
-            <a:ext cx="1893916" cy="369332"/>
+            <a:off x="8591878" y="1565116"/>
+            <a:ext cx="1152880" cy="646331"/>
           </a:xfrm>
           <a:prstGeom prst="rect">
             <a:avLst/>
@@ -4784,11 +4889,14 @@
             <a:pPr algn="ctr"/>
             <a:r>
               <a:rPr lang="en-US" dirty="0" smtClean="0"/>
-              <a:t>:</a:t>
-            </a:r>
-            <a:r>
-              <a:rPr lang="en-US" dirty="0" err="1" smtClean="0"/>
-              <a:t>BackupCommand</a:t>
+              <a:t>:Backup</a:t>
+            </a:r>
+          </a:p>
+          <a:p>
+            <a:pPr algn="ctr"/>
+            <a:r>
+              <a:rPr lang="en-US" dirty="0" smtClean="0"/>
+              <a:t>Command</a:t>
             </a:r>
             <a:endParaRPr lang="en-US" dirty="0"/>
           </a:p>
@@ -4796,9 +4904,9 @@
       </p:sp>
       <p:cxnSp>
         <p:nvCxnSpPr>
-          <p:cNvPr id="8" name="Straight Connector 7"/>
+          <p:cNvPr id="51" name="Straight Connector 50"/>
           <p:cNvCxnSpPr>
-            <a:stCxn id="6" idx="2"/>
+            <a:stCxn id="48" idx="2"/>
           </p:cNvCxnSpPr>
           <p:nvPr/>
         </p:nvCxnSpPr>
@@ -4834,7 +4942,7 @@
       </p:cxnSp>
       <p:sp>
         <p:nvSpPr>
-          <p:cNvPr id="9" name="Rectangle 8"/>
+          <p:cNvPr id="52" name="Rectangle 51"/>
           <p:cNvSpPr/>
           <p:nvPr/>
         </p:nvSpPr>
@@ -4879,7 +4987,7 @@
       </p:sp>
       <p:cxnSp>
         <p:nvCxnSpPr>
-          <p:cNvPr id="10" name="Straight Arrow Connector 9"/>
+          <p:cNvPr id="53" name="Straight Arrow Connector 52"/>
           <p:cNvCxnSpPr/>
           <p:nvPr/>
         </p:nvCxnSpPr>
@@ -4915,7 +5023,7 @@
       </p:cxnSp>
       <p:sp>
         <p:nvSpPr>
-          <p:cNvPr id="11" name="TextBox 10"/>
+          <p:cNvPr id="54" name="TextBox 53"/>
           <p:cNvSpPr txBox="1"/>
           <p:nvPr/>
         </p:nvSpPr>
@@ -4938,11 +5046,7 @@
             <a:pPr algn="ctr"/>
             <a:r>
               <a:rPr lang="en-US" sz="1000" dirty="0" smtClean="0"/>
-              <a:t>execute</a:t>
-            </a:r>
-            <a:r>
-              <a:rPr lang="en-US" sz="1000" dirty="0" smtClean="0"/>
-              <a:t>(“backup”)</a:t>
+              <a:t>execute(“backup”)</a:t>
             </a:r>
             <a:endParaRPr lang="en-US" sz="1000" dirty="0"/>
           </a:p>
@@ -4950,14 +5054,14 @@
       </p:sp>
       <p:cxnSp>
         <p:nvCxnSpPr>
-          <p:cNvPr id="12" name="Straight Connector 11"/>
+          <p:cNvPr id="55" name="Straight Connector 54"/>
           <p:cNvCxnSpPr/>
           <p:nvPr/>
         </p:nvCxnSpPr>
         <p:spPr>
           <a:xfrm>
             <a:off x="4096906" y="933193"/>
-            <a:ext cx="0" cy="1644103"/>
+            <a:ext cx="0" cy="5506001"/>
           </a:xfrm>
           <a:prstGeom prst="line">
             <a:avLst/>
@@ -4983,14 +5087,14 @@
       </p:cxnSp>
       <p:sp>
         <p:nvSpPr>
-          <p:cNvPr id="13" name="Rectangle 12"/>
+          <p:cNvPr id="56" name="Rectangle 55"/>
           <p:cNvSpPr/>
           <p:nvPr/>
         </p:nvSpPr>
         <p:spPr>
           <a:xfrm>
             <a:off x="3991182" y="1349123"/>
-            <a:ext cx="206102" cy="959949"/>
+            <a:ext cx="227904" cy="3722749"/>
           </a:xfrm>
           <a:prstGeom prst="rect">
             <a:avLst/>
@@ -5028,7 +5132,7 @@
       </p:sp>
       <p:cxnSp>
         <p:nvCxnSpPr>
-          <p:cNvPr id="14" name="Straight Arrow Connector 13"/>
+          <p:cNvPr id="57" name="Straight Arrow Connector 56"/>
           <p:cNvCxnSpPr/>
           <p:nvPr/>
         </p:nvCxnSpPr>
@@ -5064,13 +5168,13 @@
       </p:cxnSp>
       <p:sp>
         <p:nvSpPr>
-          <p:cNvPr id="15" name="TextBox 14"/>
+          <p:cNvPr id="58" name="TextBox 57"/>
           <p:cNvSpPr txBox="1"/>
           <p:nvPr/>
         </p:nvSpPr>
         <p:spPr>
           <a:xfrm>
-            <a:off x="2188413" y="1147238"/>
+            <a:off x="2188416" y="1147238"/>
             <a:ext cx="1566454" cy="246221"/>
           </a:xfrm>
           <a:prstGeom prst="rect">
@@ -5097,47 +5201,92 @@
           </a:p>
         </p:txBody>
       </p:sp>
+      <p:sp>
+        <p:nvSpPr>
+          <p:cNvPr id="59" name="TextBox 58"/>
+          <p:cNvSpPr txBox="1"/>
+          <p:nvPr/>
+        </p:nvSpPr>
+        <p:spPr>
+          <a:xfrm>
+            <a:off x="4420882" y="1321818"/>
+            <a:ext cx="2119491" cy="246221"/>
+          </a:xfrm>
+          <a:prstGeom prst="rect">
+            <a:avLst/>
+          </a:prstGeom>
+          <a:noFill/>
+        </p:spPr>
+        <p:txBody>
+          <a:bodyPr wrap="none" rtlCol="0">
+            <a:spAutoFit/>
+          </a:bodyPr>
+          <a:lstStyle/>
+          <a:p>
+            <a:pPr algn="ctr"/>
+            <a:r>
+              <a:rPr lang="en-US" sz="1000" dirty="0" err="1" smtClean="0"/>
+              <a:t>BackupCommandParser</a:t>
+            </a:r>
+            <a:r>
+              <a:rPr lang="en-US" sz="1000" dirty="0" smtClean="0"/>
+              <a:t>().parse(</a:t>
+            </a:r>
+            <a:r>
+              <a:rPr lang="en-US" sz="1000" dirty="0" err="1" smtClean="0"/>
+              <a:t>args</a:t>
+            </a:r>
+            <a:r>
+              <a:rPr lang="en-US" sz="1000" dirty="0" smtClean="0"/>
+              <a:t>)</a:t>
+            </a:r>
+            <a:endParaRPr lang="en-US" sz="1000" dirty="0"/>
+          </a:p>
+        </p:txBody>
+      </p:sp>
       <p:cxnSp>
         <p:nvCxnSpPr>
-          <p:cNvPr id="16" name="Straight Connector 15"/>
+          <p:cNvPr id="60" name="Straight Arrow Connector 59"/>
           <p:cNvCxnSpPr/>
           <p:nvPr/>
         </p:nvCxnSpPr>
         <p:spPr>
           <a:xfrm>
-            <a:off x="6108874" y="1692981"/>
-            <a:ext cx="0" cy="4932059"/>
-          </a:xfrm>
-          <a:prstGeom prst="line">
-            <a:avLst/>
-          </a:prstGeom>
-          <a:ln/>
+            <a:off x="4199595" y="1546769"/>
+            <a:ext cx="2541008" cy="0"/>
+          </a:xfrm>
+          <a:prstGeom prst="straightConnector1">
+            <a:avLst/>
+          </a:prstGeom>
+          <a:ln>
+            <a:tailEnd type="triangle"/>
+          </a:ln>
         </p:spPr>
         <p:style>
-          <a:lnRef idx="3">
-            <a:schemeClr val="lt1"/>
+          <a:lnRef idx="1">
+            <a:schemeClr val="accent1"/>
           </a:lnRef>
-          <a:fillRef idx="1">
-            <a:schemeClr val="accent4"/>
+          <a:fillRef idx="0">
+            <a:schemeClr val="accent1"/>
           </a:fillRef>
-          <a:effectRef idx="1">
-            <a:schemeClr val="accent4"/>
+          <a:effectRef idx="0">
+            <a:schemeClr val="accent1"/>
           </a:effectRef>
           <a:fontRef idx="minor">
-            <a:schemeClr val="lt1"/>
+            <a:schemeClr val="tx1"/>
           </a:fontRef>
         </p:style>
       </p:cxnSp>
       <p:sp>
         <p:nvSpPr>
-          <p:cNvPr id="17" name="Rectangle 16"/>
+          <p:cNvPr id="61" name="Rectangle 60"/>
           <p:cNvSpPr/>
           <p:nvPr/>
         </p:nvSpPr>
         <p:spPr>
           <a:xfrm>
-            <a:off x="6016811" y="1637751"/>
-            <a:ext cx="186883" cy="374226"/>
+            <a:off x="9099384" y="2411501"/>
+            <a:ext cx="192132" cy="2014195"/>
           </a:xfrm>
           <a:prstGeom prst="rect">
             <a:avLst/>
@@ -5173,58 +5322,25 @@
           </a:p>
         </p:txBody>
       </p:sp>
-      <p:sp>
-        <p:nvSpPr>
-          <p:cNvPr id="18" name="TextBox 17"/>
-          <p:cNvSpPr txBox="1"/>
-          <p:nvPr/>
-        </p:nvSpPr>
-        <p:spPr>
-          <a:xfrm>
-            <a:off x="4359155" y="1054305"/>
-            <a:ext cx="654346" cy="246221"/>
-          </a:xfrm>
-          <a:prstGeom prst="rect">
-            <a:avLst/>
-          </a:prstGeom>
-          <a:noFill/>
-        </p:spPr>
-        <p:txBody>
-          <a:bodyPr wrap="none" rtlCol="0">
-            <a:spAutoFit/>
-          </a:bodyPr>
-          <a:lstStyle/>
-          <a:p>
-            <a:pPr algn="ctr"/>
-            <a:r>
-              <a:rPr lang="en-US" sz="1000" dirty="0" smtClean="0"/>
-              <a:t>parse</a:t>
-            </a:r>
-            <a:r>
-              <a:rPr lang="en-US" sz="1000" dirty="0" smtClean="0"/>
-              <a:t>(“”)</a:t>
-            </a:r>
-            <a:endParaRPr lang="en-US" sz="1000" dirty="0"/>
-          </a:p>
-        </p:txBody>
-      </p:sp>
       <p:cxnSp>
         <p:nvCxnSpPr>
-          <p:cNvPr id="19" name="Straight Arrow Connector 18"/>
-          <p:cNvCxnSpPr>
-            <a:endCxn id="9" idx="1"/>
-          </p:cNvCxnSpPr>
+          <p:cNvPr id="62" name="Straight Arrow Connector 61"/>
+          <p:cNvCxnSpPr/>
           <p:nvPr/>
         </p:nvCxnSpPr>
         <p:spPr>
-          <a:xfrm>
-            <a:off x="4197284" y="1446317"/>
-            <a:ext cx="978087" cy="0"/>
+          <a:xfrm flipH="1" flipV="1">
+            <a:off x="6925255" y="4422594"/>
+            <a:ext cx="2270195" cy="3102"/>
           </a:xfrm>
           <a:prstGeom prst="straightConnector1">
             <a:avLst/>
           </a:prstGeom>
           <a:ln>
+            <a:solidFill>
+              <a:srgbClr val="92D050"/>
+            </a:solidFill>
+            <a:prstDash val="dash"/>
             <a:tailEnd type="triangle"/>
           </a:ln>
         </p:spPr>
@@ -5243,16 +5359,306 @@
           </a:fontRef>
         </p:style>
       </p:cxnSp>
-      <p:sp>
-        <p:nvSpPr>
-          <p:cNvPr id="20" name="Rectangle 19"/>
+      <p:cxnSp>
+        <p:nvCxnSpPr>
+          <p:cNvPr id="63" name="Straight Connector 62"/>
+          <p:cNvCxnSpPr>
+            <a:stCxn id="49" idx="2"/>
+          </p:cNvCxnSpPr>
+          <p:nvPr/>
+        </p:nvCxnSpPr>
+        <p:spPr>
+          <a:xfrm flipH="1">
+            <a:off x="11388561" y="1174426"/>
+            <a:ext cx="10574" cy="5450614"/>
+          </a:xfrm>
+          <a:prstGeom prst="line">
+            <a:avLst/>
+          </a:prstGeom>
+          <a:ln>
+            <a:solidFill>
+              <a:schemeClr val="tx1"/>
+            </a:solidFill>
+            <a:prstDash val="dash"/>
+          </a:ln>
+        </p:spPr>
+        <p:style>
+          <a:lnRef idx="1">
+            <a:schemeClr val="accent1"/>
+          </a:lnRef>
+          <a:fillRef idx="0">
+            <a:schemeClr val="accent1"/>
+          </a:fillRef>
+          <a:effectRef idx="0">
+            <a:schemeClr val="accent1"/>
+          </a:effectRef>
+          <a:fontRef idx="minor">
+            <a:schemeClr val="tx1"/>
+          </a:fontRef>
+        </p:style>
+      </p:cxnSp>
+      <p:sp>
+        <p:nvSpPr>
+          <p:cNvPr id="64" name="Rectangle 63"/>
           <p:cNvSpPr/>
           <p:nvPr/>
         </p:nvSpPr>
         <p:spPr>
           <a:xfrm>
-            <a:off x="6027295" y="2840234"/>
-            <a:ext cx="176399" cy="3345894"/>
+            <a:off x="11300360" y="3155943"/>
+            <a:ext cx="197551" cy="2652233"/>
+          </a:xfrm>
+          <a:prstGeom prst="rect">
+            <a:avLst/>
+          </a:prstGeom>
+        </p:spPr>
+        <p:style>
+          <a:lnRef idx="2">
+            <a:schemeClr val="dk1">
+              <a:shade val="50000"/>
+            </a:schemeClr>
+          </a:lnRef>
+          <a:fillRef idx="1">
+            <a:schemeClr val="dk1"/>
+          </a:fillRef>
+          <a:effectRef idx="0">
+            <a:schemeClr val="dk1"/>
+          </a:effectRef>
+          <a:fontRef idx="minor">
+            <a:schemeClr val="lt1"/>
+          </a:fontRef>
+        </p:style>
+        <p:txBody>
+          <a:bodyPr rot="0" spcFirstLastPara="0" vertOverflow="overflow" horzOverflow="overflow" vert="horz" wrap="square" lIns="91440" tIns="45720" rIns="91440" bIns="45720" numCol="1" spcCol="0" rtlCol="0" fromWordArt="0" anchor="ctr" anchorCtr="0" forceAA="0" compatLnSpc="1">
+            <a:prstTxWarp prst="textNoShape">
+              <a:avLst/>
+            </a:prstTxWarp>
+            <a:noAutofit/>
+          </a:bodyPr>
+          <a:lstStyle/>
+          <a:p>
+            <a:pPr algn="ctr"/>
+            <a:endParaRPr lang="en-US"/>
+          </a:p>
+        </p:txBody>
+      </p:sp>
+      <p:cxnSp>
+        <p:nvCxnSpPr>
+          <p:cNvPr id="65" name="Straight Arrow Connector 64"/>
+          <p:cNvCxnSpPr/>
+          <p:nvPr/>
+        </p:nvCxnSpPr>
+        <p:spPr>
+          <a:xfrm>
+            <a:off x="9275783" y="3180327"/>
+            <a:ext cx="2039632" cy="0"/>
+          </a:xfrm>
+          <a:prstGeom prst="straightConnector1">
+            <a:avLst/>
+          </a:prstGeom>
+          <a:ln>
+            <a:tailEnd type="triangle"/>
+          </a:ln>
+        </p:spPr>
+        <p:style>
+          <a:lnRef idx="1">
+            <a:schemeClr val="accent1"/>
+          </a:lnRef>
+          <a:fillRef idx="0">
+            <a:schemeClr val="accent1"/>
+          </a:fillRef>
+          <a:effectRef idx="0">
+            <a:schemeClr val="accent1"/>
+          </a:effectRef>
+          <a:fontRef idx="minor">
+            <a:schemeClr val="tx1"/>
+          </a:fontRef>
+        </p:style>
+      </p:cxnSp>
+      <p:sp>
+        <p:nvSpPr>
+          <p:cNvPr id="66" name="TextBox 65"/>
+          <p:cNvSpPr txBox="1"/>
+          <p:nvPr/>
+        </p:nvSpPr>
+        <p:spPr>
+          <a:xfrm>
+            <a:off x="9690565" y="2980272"/>
+            <a:ext cx="1268296" cy="400110"/>
+          </a:xfrm>
+          <a:prstGeom prst="rect">
+            <a:avLst/>
+          </a:prstGeom>
+          <a:noFill/>
+        </p:spPr>
+        <p:txBody>
+          <a:bodyPr wrap="none" rtlCol="0">
+            <a:spAutoFit/>
+          </a:bodyPr>
+          <a:lstStyle/>
+          <a:p>
+            <a:pPr algn="ctr"/>
+            <a:r>
+              <a:rPr lang="en-US" sz="1000" dirty="0" err="1" smtClean="0"/>
+              <a:t>backupAddressBook</a:t>
+            </a:r>
+            <a:r>
+              <a:rPr lang="en-US" sz="1000" dirty="0" smtClean="0"/>
+              <a:t> </a:t>
+            </a:r>
+          </a:p>
+          <a:p>
+            <a:pPr algn="ctr"/>
+            <a:r>
+              <a:rPr lang="en-US" sz="1000" dirty="0" smtClean="0"/>
+              <a:t>(</a:t>
+            </a:r>
+            <a:r>
+              <a:rPr lang="en-US" sz="1000" dirty="0" err="1" smtClean="0"/>
+              <a:t>addressbook</a:t>
+            </a:r>
+            <a:r>
+              <a:rPr lang="en-US" sz="1000" dirty="0" smtClean="0"/>
+              <a:t>)</a:t>
+            </a:r>
+            <a:endParaRPr lang="en-US" sz="1000" dirty="0"/>
+          </a:p>
+        </p:txBody>
+      </p:sp>
+      <p:sp>
+        <p:nvSpPr>
+          <p:cNvPr id="67" name="Rectangle 66"/>
+          <p:cNvSpPr/>
+          <p:nvPr/>
+        </p:nvSpPr>
+        <p:spPr>
+          <a:xfrm>
+            <a:off x="110210" y="115980"/>
+            <a:ext cx="11923293" cy="6632292"/>
+          </a:xfrm>
+          <a:prstGeom prst="rect">
+            <a:avLst/>
+          </a:prstGeom>
+          <a:noFill/>
+        </p:spPr>
+        <p:style>
+          <a:lnRef idx="2">
+            <a:schemeClr val="accent1">
+              <a:shade val="50000"/>
+            </a:schemeClr>
+          </a:lnRef>
+          <a:fillRef idx="1">
+            <a:schemeClr val="accent1"/>
+          </a:fillRef>
+          <a:effectRef idx="0">
+            <a:schemeClr val="accent1"/>
+          </a:effectRef>
+          <a:fontRef idx="minor">
+            <a:schemeClr val="lt1"/>
+          </a:fontRef>
+        </p:style>
+        <p:txBody>
+          <a:bodyPr rtlCol="0" anchor="ctr"/>
+          <a:lstStyle/>
+          <a:p>
+            <a:pPr algn="ctr"/>
+            <a:endParaRPr lang="en-US" dirty="0"/>
+          </a:p>
+        </p:txBody>
+      </p:sp>
+      <p:sp>
+        <p:nvSpPr>
+          <p:cNvPr id="68" name="TextBox 67"/>
+          <p:cNvSpPr txBox="1"/>
+          <p:nvPr/>
+        </p:nvSpPr>
+        <p:spPr>
+          <a:xfrm>
+            <a:off x="116793" y="114135"/>
+            <a:ext cx="2631490" cy="369332"/>
+          </a:xfrm>
+          <a:prstGeom prst="rect">
+            <a:avLst/>
+          </a:prstGeom>
+        </p:spPr>
+        <p:style>
+          <a:lnRef idx="2">
+            <a:schemeClr val="accent1"/>
+          </a:lnRef>
+          <a:fillRef idx="1">
+            <a:schemeClr val="lt1"/>
+          </a:fillRef>
+          <a:effectRef idx="0">
+            <a:schemeClr val="accent1"/>
+          </a:effectRef>
+          <a:fontRef idx="minor">
+            <a:schemeClr val="dk1"/>
+          </a:fontRef>
+        </p:style>
+        <p:txBody>
+          <a:bodyPr wrap="none" rtlCol="0">
+            <a:spAutoFit/>
+          </a:bodyPr>
+          <a:lstStyle/>
+          <a:p>
+            <a:r>
+              <a:rPr lang="en-US" dirty="0" smtClean="0"/>
+              <a:t>Backup Sequence</a:t>
+            </a:r>
+            <a:r>
+              <a:rPr lang="en-US" smtClean="0"/>
+              <a:t>: Default</a:t>
+            </a:r>
+            <a:endParaRPr lang="en-US" dirty="0"/>
+          </a:p>
+        </p:txBody>
+      </p:sp>
+      <p:cxnSp>
+        <p:nvCxnSpPr>
+          <p:cNvPr id="69" name="Straight Connector 68"/>
+          <p:cNvCxnSpPr/>
+          <p:nvPr/>
+        </p:nvCxnSpPr>
+        <p:spPr>
+          <a:xfrm>
+            <a:off x="6830419" y="1230000"/>
+            <a:ext cx="0" cy="4956128"/>
+          </a:xfrm>
+          <a:prstGeom prst="line">
+            <a:avLst/>
+          </a:prstGeom>
+          <a:ln>
+            <a:solidFill>
+              <a:srgbClr val="00B050"/>
+            </a:solidFill>
+            <a:prstDash val="dash"/>
+          </a:ln>
+        </p:spPr>
+        <p:style>
+          <a:lnRef idx="1">
+            <a:schemeClr val="accent1"/>
+          </a:lnRef>
+          <a:fillRef idx="0">
+            <a:schemeClr val="accent1"/>
+          </a:fillRef>
+          <a:effectRef idx="0">
+            <a:schemeClr val="accent1"/>
+          </a:effectRef>
+          <a:fontRef idx="minor">
+            <a:schemeClr val="tx1"/>
+          </a:fontRef>
+        </p:style>
+      </p:cxnSp>
+      <p:sp>
+        <p:nvSpPr>
+          <p:cNvPr id="70" name="TextBox 69"/>
+          <p:cNvSpPr txBox="1"/>
+          <p:nvPr/>
+        </p:nvSpPr>
+        <p:spPr>
+          <a:xfrm>
+            <a:off x="6281833" y="583669"/>
+            <a:ext cx="1152880" cy="646331"/>
           </a:xfrm>
           <a:prstGeom prst="rect">
             <a:avLst/>
@@ -5275,72 +5681,6 @@
           </a:fontRef>
         </p:style>
         <p:txBody>
-          <a:bodyPr rot="0" spcFirstLastPara="0" vertOverflow="overflow" horzOverflow="overflow" vert="horz" wrap="square" lIns="91440" tIns="45720" rIns="91440" bIns="45720" numCol="1" spcCol="0" rtlCol="0" fromWordArt="0" anchor="ctr" anchorCtr="0" forceAA="0" compatLnSpc="1">
-            <a:prstTxWarp prst="textNoShape">
-              <a:avLst/>
-            </a:prstTxWarp>
-            <a:noAutofit/>
-          </a:bodyPr>
-          <a:lstStyle/>
-          <a:p>
-            <a:pPr algn="ctr"/>
-            <a:endParaRPr lang="en-US"/>
-          </a:p>
-        </p:txBody>
-      </p:sp>
-      <p:cxnSp>
-        <p:nvCxnSpPr>
-          <p:cNvPr id="21" name="Straight Arrow Connector 20"/>
-          <p:cNvCxnSpPr/>
-          <p:nvPr/>
-        </p:nvCxnSpPr>
-        <p:spPr>
-          <a:xfrm flipV="1">
-            <a:off x="1807614" y="2901147"/>
-            <a:ext cx="4209197" cy="32959"/>
-          </a:xfrm>
-          <a:prstGeom prst="straightConnector1">
-            <a:avLst/>
-          </a:prstGeom>
-          <a:ln>
-            <a:solidFill>
-              <a:schemeClr val="accent2"/>
-            </a:solidFill>
-            <a:tailEnd type="triangle"/>
-          </a:ln>
-        </p:spPr>
-        <p:style>
-          <a:lnRef idx="1">
-            <a:schemeClr val="accent1"/>
-          </a:lnRef>
-          <a:fillRef idx="0">
-            <a:schemeClr val="accent1"/>
-          </a:fillRef>
-          <a:effectRef idx="0">
-            <a:schemeClr val="accent1"/>
-          </a:effectRef>
-          <a:fontRef idx="minor">
-            <a:schemeClr val="tx1"/>
-          </a:fontRef>
-        </p:style>
-      </p:cxnSp>
-      <p:sp>
-        <p:nvSpPr>
-          <p:cNvPr id="22" name="TextBox 21"/>
-          <p:cNvSpPr txBox="1"/>
-          <p:nvPr/>
-        </p:nvSpPr>
-        <p:spPr>
-          <a:xfrm>
-            <a:off x="3598885" y="2705301"/>
-            <a:ext cx="673582" cy="246221"/>
-          </a:xfrm>
-          <a:prstGeom prst="rect">
-            <a:avLst/>
-          </a:prstGeom>
-          <a:noFill/>
-        </p:spPr>
-        <p:txBody>
           <a:bodyPr wrap="none" rtlCol="0">
             <a:spAutoFit/>
           </a:bodyPr>
@@ -5348,69 +5688,34 @@
           <a:p>
             <a:pPr algn="ctr"/>
             <a:r>
-              <a:rPr lang="en-US" sz="1000" dirty="0" smtClean="0"/>
-              <a:t>execute()</a:t>
-            </a:r>
-            <a:endParaRPr lang="en-US" sz="1000" dirty="0"/>
-          </a:p>
-        </p:txBody>
-      </p:sp>
-      <p:cxnSp>
-        <p:nvCxnSpPr>
-          <p:cNvPr id="23" name="Straight Arrow Connector 22"/>
-          <p:cNvCxnSpPr/>
+              <a:rPr lang="en-US" dirty="0" smtClean="0"/>
+              <a:t>:Backup</a:t>
+            </a:r>
+          </a:p>
+          <a:p>
+            <a:pPr algn="ctr"/>
+            <a:r>
+              <a:rPr lang="en-US" dirty="0" smtClean="0"/>
+              <a:t>Command</a:t>
+            </a:r>
+            <a:endParaRPr lang="en-US" dirty="0"/>
+          </a:p>
+        </p:txBody>
+      </p:sp>
+      <p:sp>
+        <p:nvSpPr>
+          <p:cNvPr id="71" name="Rectangle 70"/>
+          <p:cNvSpPr/>
           <p:nvPr/>
-        </p:nvCxnSpPr>
-        <p:spPr>
-          <a:xfrm flipH="1">
-            <a:off x="1782501" y="6186128"/>
-            <a:ext cx="4244794" cy="17902"/>
-          </a:xfrm>
-          <a:prstGeom prst="straightConnector1">
-            <a:avLst/>
-          </a:prstGeom>
-          <a:ln>
-            <a:solidFill>
-              <a:srgbClr val="92D050"/>
-            </a:solidFill>
-            <a:prstDash val="dash"/>
-            <a:tailEnd type="triangle"/>
-          </a:ln>
-        </p:spPr>
-        <p:style>
-          <a:lnRef idx="1">
-            <a:schemeClr val="accent1"/>
-          </a:lnRef>
-          <a:fillRef idx="0">
-            <a:schemeClr val="accent1"/>
-          </a:fillRef>
-          <a:effectRef idx="0">
-            <a:schemeClr val="accent1"/>
-          </a:effectRef>
-          <a:fontRef idx="minor">
-            <a:schemeClr val="tx1"/>
-          </a:fontRef>
-        </p:style>
-      </p:cxnSp>
-      <p:cxnSp>
-        <p:nvCxnSpPr>
-          <p:cNvPr id="24" name="Straight Arrow Connector 23"/>
-          <p:cNvCxnSpPr>
-            <a:stCxn id="29" idx="2"/>
-          </p:cNvCxnSpPr>
-          <p:nvPr/>
-        </p:nvCxnSpPr>
-        <p:spPr>
-          <a:xfrm flipH="1">
-            <a:off x="4193728" y="2011977"/>
-            <a:ext cx="1916525" cy="0"/>
-          </a:xfrm>
-          <a:prstGeom prst="straightConnector1">
-            <a:avLst/>
-          </a:prstGeom>
-          <a:ln>
-            <a:tailEnd type="triangle"/>
-          </a:ln>
+        </p:nvSpPr>
+        <p:spPr>
+          <a:xfrm>
+            <a:off x="6715412" y="1532366"/>
+            <a:ext cx="209843" cy="3076210"/>
+          </a:xfrm>
+          <a:prstGeom prst="rect">
+            <a:avLst/>
+          </a:prstGeom>
         </p:spPr>
         <p:style>
           <a:lnRef idx="2">
@@ -5428,57 +5733,36 @@
             <a:schemeClr val="lt1"/>
           </a:fontRef>
         </p:style>
-      </p:cxnSp>
-      <p:sp>
-        <p:nvSpPr>
-          <p:cNvPr id="25" name="TextBox 24"/>
-          <p:cNvSpPr txBox="1"/>
-          <p:nvPr/>
-        </p:nvSpPr>
-        <p:spPr>
-          <a:xfrm>
-            <a:off x="3851611" y="5939907"/>
-            <a:ext cx="482824" cy="246221"/>
-          </a:xfrm>
-          <a:prstGeom prst="rect">
-            <a:avLst/>
-          </a:prstGeom>
-          <a:noFill/>
-        </p:spPr>
-        <p:txBody>
-          <a:bodyPr wrap="none" rtlCol="0">
-            <a:spAutoFit/>
+        <p:txBody>
+          <a:bodyPr rot="0" spcFirstLastPara="0" vertOverflow="overflow" horzOverflow="overflow" vert="horz" wrap="square" lIns="91440" tIns="45720" rIns="91440" bIns="45720" numCol="1" spcCol="0" rtlCol="0" fromWordArt="0" anchor="ctr" anchorCtr="0" forceAA="0" compatLnSpc="1">
+            <a:prstTxWarp prst="textNoShape">
+              <a:avLst/>
+            </a:prstTxWarp>
+            <a:noAutofit/>
           </a:bodyPr>
           <a:lstStyle/>
           <a:p>
             <a:pPr algn="ctr"/>
-            <a:r>
-              <a:rPr lang="en-US" sz="1000" dirty="0" smtClean="0"/>
-              <a:t>result</a:t>
-            </a:r>
-            <a:endParaRPr lang="en-US" sz="1000" dirty="0"/>
+            <a:endParaRPr lang="en-US"/>
           </a:p>
         </p:txBody>
       </p:sp>
       <p:cxnSp>
         <p:nvCxnSpPr>
-          <p:cNvPr id="26" name="Straight Connector 25"/>
+          <p:cNvPr id="72" name="Straight Arrow Connector 71"/>
           <p:cNvCxnSpPr/>
           <p:nvPr/>
         </p:nvCxnSpPr>
         <p:spPr>
           <a:xfrm>
-            <a:off x="8331526" y="1934279"/>
-            <a:ext cx="0" cy="4690761"/>
-          </a:xfrm>
-          <a:prstGeom prst="line">
+            <a:off x="6925255" y="2053492"/>
+            <a:ext cx="1675366" cy="0"/>
+          </a:xfrm>
+          <a:prstGeom prst="straightConnector1">
             <a:avLst/>
           </a:prstGeom>
           <a:ln>
-            <a:solidFill>
-              <a:schemeClr val="tx1"/>
-            </a:solidFill>
-            <a:prstDash val="dash"/>
+            <a:tailEnd type="triangle"/>
           </a:ln>
         </p:spPr>
         <p:style>
@@ -5498,64 +5782,58 @@
       </p:cxnSp>
       <p:sp>
         <p:nvSpPr>
-          <p:cNvPr id="27" name="Rectangle 26"/>
-          <p:cNvSpPr/>
+          <p:cNvPr id="73" name="TextBox 72"/>
+          <p:cNvSpPr txBox="1"/>
           <p:nvPr/>
         </p:nvSpPr>
         <p:spPr>
           <a:xfrm>
-            <a:off x="8243326" y="3155943"/>
-            <a:ext cx="197551" cy="2652233"/>
+            <a:off x="7107390" y="1791115"/>
+            <a:ext cx="1281121" cy="246221"/>
           </a:xfrm>
           <a:prstGeom prst="rect">
             <a:avLst/>
           </a:prstGeom>
-        </p:spPr>
-        <p:style>
-          <a:lnRef idx="2">
-            <a:schemeClr val="dk1">
-              <a:shade val="50000"/>
-            </a:schemeClr>
-          </a:lnRef>
-          <a:fillRef idx="1">
-            <a:schemeClr val="dk1"/>
-          </a:fillRef>
-          <a:effectRef idx="0">
-            <a:schemeClr val="dk1"/>
-          </a:effectRef>
-          <a:fontRef idx="minor">
-            <a:schemeClr val="lt1"/>
-          </a:fontRef>
-        </p:style>
-        <p:txBody>
-          <a:bodyPr rot="0" spcFirstLastPara="0" vertOverflow="overflow" horzOverflow="overflow" vert="horz" wrap="square" lIns="91440" tIns="45720" rIns="91440" bIns="45720" numCol="1" spcCol="0" rtlCol="0" fromWordArt="0" anchor="ctr" anchorCtr="0" forceAA="0" compatLnSpc="1">
-            <a:prstTxWarp prst="textNoShape">
-              <a:avLst/>
-            </a:prstTxWarp>
-            <a:noAutofit/>
+          <a:noFill/>
+        </p:spPr>
+        <p:txBody>
+          <a:bodyPr wrap="none" rtlCol="0">
+            <a:spAutoFit/>
           </a:bodyPr>
           <a:lstStyle/>
           <a:p>
             <a:pPr algn="ctr"/>
-            <a:endParaRPr lang="en-US"/>
+            <a:r>
+              <a:rPr lang="en-US" sz="1000" dirty="0" err="1" smtClean="0"/>
+              <a:t>BackupCommand</a:t>
+            </a:r>
+            <a:r>
+              <a:rPr lang="en-US" sz="1000" dirty="0" smtClean="0"/>
+              <a:t>(“”)</a:t>
+            </a:r>
+            <a:endParaRPr lang="en-US" sz="1000" dirty="0"/>
           </a:p>
         </p:txBody>
       </p:sp>
       <p:cxnSp>
         <p:nvCxnSpPr>
-          <p:cNvPr id="28" name="Straight Arrow Connector 27"/>
+          <p:cNvPr id="74" name="Straight Arrow Connector 73"/>
           <p:cNvCxnSpPr/>
           <p:nvPr/>
         </p:nvCxnSpPr>
         <p:spPr>
-          <a:xfrm>
-            <a:off x="6203694" y="3180327"/>
-            <a:ext cx="2039632" cy="0"/>
+          <a:xfrm flipH="1" flipV="1">
+            <a:off x="4216430" y="4523232"/>
+            <a:ext cx="2462411" cy="11923"/>
           </a:xfrm>
           <a:prstGeom prst="straightConnector1">
             <a:avLst/>
           </a:prstGeom>
           <a:ln>
+            <a:solidFill>
+              <a:srgbClr val="92D050"/>
+            </a:solidFill>
+            <a:prstDash val="dash"/>
             <a:tailEnd type="triangle"/>
           </a:ln>
         </p:spPr>
@@ -5574,125 +5852,43 @@
           </a:fontRef>
         </p:style>
       </p:cxnSp>
-      <p:sp>
-        <p:nvSpPr>
-          <p:cNvPr id="29" name="TextBox 28"/>
-          <p:cNvSpPr txBox="1"/>
+      <p:cxnSp>
+        <p:nvCxnSpPr>
+          <p:cNvPr id="75" name="Straight Arrow Connector 74"/>
+          <p:cNvCxnSpPr/>
           <p:nvPr/>
-        </p:nvSpPr>
-        <p:spPr>
-          <a:xfrm>
-            <a:off x="6410233" y="2934106"/>
-            <a:ext cx="1697902" cy="246221"/>
-          </a:xfrm>
-          <a:prstGeom prst="rect">
-            <a:avLst/>
-          </a:prstGeom>
-          <a:noFill/>
-        </p:spPr>
-        <p:txBody>
-          <a:bodyPr wrap="none" rtlCol="0">
-            <a:spAutoFit/>
-          </a:bodyPr>
-          <a:lstStyle/>
-          <a:p>
-            <a:pPr algn="ctr"/>
-            <a:r>
-              <a:rPr lang="en-US" sz="1000" dirty="0" err="1" smtClean="0"/>
-              <a:t>backupAddressBookDefault</a:t>
-            </a:r>
-            <a:r>
-              <a:rPr lang="en-US" sz="1000" dirty="0" smtClean="0"/>
-              <a:t>()</a:t>
-            </a:r>
-            <a:endParaRPr lang="en-US" sz="1000" dirty="0"/>
-          </a:p>
-        </p:txBody>
-      </p:sp>
-      <p:sp>
-        <p:nvSpPr>
-          <p:cNvPr id="30" name="Rectangle 29"/>
-          <p:cNvSpPr/>
-          <p:nvPr/>
-        </p:nvSpPr>
-        <p:spPr>
-          <a:xfrm>
-            <a:off x="110211" y="115980"/>
-            <a:ext cx="9415754" cy="6632292"/>
-          </a:xfrm>
-          <a:prstGeom prst="rect">
-            <a:avLst/>
-          </a:prstGeom>
-          <a:noFill/>
+        </p:nvCxnSpPr>
+        <p:spPr>
+          <a:xfrm flipH="1" flipV="1">
+            <a:off x="1811370" y="4986528"/>
+            <a:ext cx="2171265" cy="14404"/>
+          </a:xfrm>
+          <a:prstGeom prst="straightConnector1">
+            <a:avLst/>
+          </a:prstGeom>
+          <a:ln>
+            <a:solidFill>
+              <a:srgbClr val="92D050"/>
+            </a:solidFill>
+            <a:prstDash val="dash"/>
+            <a:tailEnd type="triangle"/>
+          </a:ln>
         </p:spPr>
         <p:style>
-          <a:lnRef idx="2">
-            <a:schemeClr val="accent1">
-              <a:shade val="50000"/>
-            </a:schemeClr>
+          <a:lnRef idx="1">
+            <a:schemeClr val="accent1"/>
           </a:lnRef>
-          <a:fillRef idx="1">
+          <a:fillRef idx="0">
             <a:schemeClr val="accent1"/>
           </a:fillRef>
           <a:effectRef idx="0">
             <a:schemeClr val="accent1"/>
           </a:effectRef>
           <a:fontRef idx="minor">
-            <a:schemeClr val="lt1"/>
+            <a:schemeClr val="tx1"/>
           </a:fontRef>
         </p:style>
-        <p:txBody>
-          <a:bodyPr rtlCol="0" anchor="ctr"/>
-          <a:lstStyle/>
-          <a:p>
-            <a:pPr algn="ctr"/>
-            <a:endParaRPr lang="en-US" dirty="0"/>
-          </a:p>
-        </p:txBody>
-      </p:sp>
-      <p:sp>
-        <p:nvSpPr>
-          <p:cNvPr id="31" name="TextBox 30"/>
-          <p:cNvSpPr txBox="1"/>
-          <p:nvPr/>
-        </p:nvSpPr>
-        <p:spPr>
-          <a:xfrm>
-            <a:off x="116793" y="114135"/>
-            <a:ext cx="2631490" cy="369332"/>
-          </a:xfrm>
-          <a:prstGeom prst="rect">
-            <a:avLst/>
-          </a:prstGeom>
-        </p:spPr>
-        <p:style>
-          <a:lnRef idx="2">
-            <a:schemeClr val="accent1"/>
-          </a:lnRef>
-          <a:fillRef idx="1">
-            <a:schemeClr val="lt1"/>
-          </a:fillRef>
-          <a:effectRef idx="0">
-            <a:schemeClr val="accent1"/>
-          </a:effectRef>
-          <a:fontRef idx="minor">
-            <a:schemeClr val="dk1"/>
-          </a:fontRef>
-        </p:style>
-        <p:txBody>
-          <a:bodyPr wrap="none" rtlCol="0">
-            <a:spAutoFit/>
-          </a:bodyPr>
-          <a:lstStyle/>
-          <a:p>
-            <a:r>
-              <a:rPr lang="en-US" dirty="0" smtClean="0"/>
-              <a:t>Backup Sequence: Default</a:t>
-            </a:r>
-            <a:endParaRPr lang="en-US" dirty="0"/>
-          </a:p>
-        </p:txBody>
-      </p:sp>
+      </p:cxnSp>
     </p:spTree>
     <p:extLst>
       <p:ext uri="{BB962C8B-B14F-4D97-AF65-F5344CB8AC3E}">

</xml_diff>

<commit_message>
[DOCS] Update docs and added contributions doc
</commit_message>
<xml_diff>
--- a/docs/diagrams/BackupCommandDiagrams.pptx
+++ b/docs/diagrams/BackupCommandDiagrams.pptx
@@ -198,7 +198,7 @@
           <a:p>
             <a:fld id="{756A9B74-E80F-5C4E-A7DD-E49C20F7C5ED}" type="datetimeFigureOut">
               <a:rPr lang="en-US" smtClean="0"/>
-              <a:t>10/29/17</a:t>
+              <a:t>11/8/17</a:t>
             </a:fld>
             <a:endParaRPr lang="en-US"/>
           </a:p>
@@ -681,7 +681,7 @@
           <a:p>
             <a:fld id="{4C707D6F-0D04-EC44-A702-F7C7F0C5C2B0}" type="datetimeFigureOut">
               <a:rPr lang="en-US" smtClean="0"/>
-              <a:t>10/29/17</a:t>
+              <a:t>11/8/17</a:t>
             </a:fld>
             <a:endParaRPr lang="en-US"/>
           </a:p>
@@ -846,7 +846,7 @@
           <a:p>
             <a:fld id="{4C707D6F-0D04-EC44-A702-F7C7F0C5C2B0}" type="datetimeFigureOut">
               <a:rPr lang="en-US" smtClean="0"/>
-              <a:t>10/29/17</a:t>
+              <a:t>11/8/17</a:t>
             </a:fld>
             <a:endParaRPr lang="en-US"/>
           </a:p>
@@ -1021,7 +1021,7 @@
           <a:p>
             <a:fld id="{4C707D6F-0D04-EC44-A702-F7C7F0C5C2B0}" type="datetimeFigureOut">
               <a:rPr lang="en-US" smtClean="0"/>
-              <a:t>10/29/17</a:t>
+              <a:t>11/8/17</a:t>
             </a:fld>
             <a:endParaRPr lang="en-US"/>
           </a:p>
@@ -1186,7 +1186,7 @@
           <a:p>
             <a:fld id="{4C707D6F-0D04-EC44-A702-F7C7F0C5C2B0}" type="datetimeFigureOut">
               <a:rPr lang="en-US" smtClean="0"/>
-              <a:t>10/29/17</a:t>
+              <a:t>11/8/17</a:t>
             </a:fld>
             <a:endParaRPr lang="en-US"/>
           </a:p>
@@ -1427,7 +1427,7 @@
           <a:p>
             <a:fld id="{4C707D6F-0D04-EC44-A702-F7C7F0C5C2B0}" type="datetimeFigureOut">
               <a:rPr lang="en-US" smtClean="0"/>
-              <a:t>10/29/17</a:t>
+              <a:t>11/8/17</a:t>
             </a:fld>
             <a:endParaRPr lang="en-US"/>
           </a:p>
@@ -1654,7 +1654,7 @@
           <a:p>
             <a:fld id="{4C707D6F-0D04-EC44-A702-F7C7F0C5C2B0}" type="datetimeFigureOut">
               <a:rPr lang="en-US" smtClean="0"/>
-              <a:t>10/29/17</a:t>
+              <a:t>11/8/17</a:t>
             </a:fld>
             <a:endParaRPr lang="en-US"/>
           </a:p>
@@ -2016,7 +2016,7 @@
           <a:p>
             <a:fld id="{4C707D6F-0D04-EC44-A702-F7C7F0C5C2B0}" type="datetimeFigureOut">
               <a:rPr lang="en-US" smtClean="0"/>
-              <a:t>10/29/17</a:t>
+              <a:t>11/8/17</a:t>
             </a:fld>
             <a:endParaRPr lang="en-US"/>
           </a:p>
@@ -2129,7 +2129,7 @@
           <a:p>
             <a:fld id="{4C707D6F-0D04-EC44-A702-F7C7F0C5C2B0}" type="datetimeFigureOut">
               <a:rPr lang="en-US" smtClean="0"/>
-              <a:t>10/29/17</a:t>
+              <a:t>11/8/17</a:t>
             </a:fld>
             <a:endParaRPr lang="en-US"/>
           </a:p>
@@ -2219,7 +2219,7 @@
           <a:p>
             <a:fld id="{4C707D6F-0D04-EC44-A702-F7C7F0C5C2B0}" type="datetimeFigureOut">
               <a:rPr lang="en-US" smtClean="0"/>
-              <a:t>10/29/17</a:t>
+              <a:t>11/8/17</a:t>
             </a:fld>
             <a:endParaRPr lang="en-US"/>
           </a:p>
@@ -2491,7 +2491,7 @@
           <a:p>
             <a:fld id="{4C707D6F-0D04-EC44-A702-F7C7F0C5C2B0}" type="datetimeFigureOut">
               <a:rPr lang="en-US" smtClean="0"/>
-              <a:t>10/29/17</a:t>
+              <a:t>11/8/17</a:t>
             </a:fld>
             <a:endParaRPr lang="en-US"/>
           </a:p>
@@ -2743,7 +2743,7 @@
           <a:p>
             <a:fld id="{4C707D6F-0D04-EC44-A702-F7C7F0C5C2B0}" type="datetimeFigureOut">
               <a:rPr lang="en-US" smtClean="0"/>
-              <a:t>10/29/17</a:t>
+              <a:t>11/8/17</a:t>
             </a:fld>
             <a:endParaRPr lang="en-US"/>
           </a:p>
@@ -2951,7 +2951,7 @@
           <a:p>
             <a:fld id="{4C707D6F-0D04-EC44-A702-F7C7F0C5C2B0}" type="datetimeFigureOut">
               <a:rPr lang="en-US" smtClean="0"/>
-              <a:t>10/29/17</a:t>
+              <a:t>11/8/17</a:t>
             </a:fld>
             <a:endParaRPr lang="en-US"/>
           </a:p>
@@ -4306,7 +4306,7 @@
         <p:spPr>
           <a:xfrm>
             <a:off x="116793" y="114135"/>
-            <a:ext cx="2660344" cy="369332"/>
+            <a:ext cx="2669962" cy="369332"/>
           </a:xfrm>
           <a:prstGeom prst="rect">
             <a:avLst/>
@@ -4333,12 +4333,12 @@
           <a:lstStyle/>
           <a:p>
             <a:r>
-              <a:rPr lang="en-US" dirty="0" smtClean="0"/>
-              <a:t>Backup Sequence</a:t>
-            </a:r>
-            <a:r>
-              <a:rPr lang="en-US" smtClean="0"/>
-              <a:t>: Custom</a:t>
+              <a:rPr lang="en-US" smtClean="0"/>
+              <a:t>Backup </a:t>
+            </a:r>
+            <a:r>
+              <a:rPr lang="en-US" smtClean="0"/>
+              <a:t>Sequence Diagram</a:t>
             </a:r>
             <a:endParaRPr lang="en-US" dirty="0"/>
           </a:p>

</xml_diff>

<commit_message>
[DG] Updated backup and lock/unlock segments in DG
</commit_message>
<xml_diff>
--- a/docs/diagrams/BackupCommandDiagrams.pptx
+++ b/docs/diagrams/BackupCommandDiagrams.pptx
@@ -198,7 +198,7 @@
           <a:p>
             <a:fld id="{756A9B74-E80F-5C4E-A7DD-E49C20F7C5ED}" type="datetimeFigureOut">
               <a:rPr lang="en-US" smtClean="0"/>
-              <a:t>11/8/17</a:t>
+              <a:t>11/11/17</a:t>
             </a:fld>
             <a:endParaRPr lang="en-US"/>
           </a:p>
@@ -681,7 +681,7 @@
           <a:p>
             <a:fld id="{4C707D6F-0D04-EC44-A702-F7C7F0C5C2B0}" type="datetimeFigureOut">
               <a:rPr lang="en-US" smtClean="0"/>
-              <a:t>11/8/17</a:t>
+              <a:t>11/11/17</a:t>
             </a:fld>
             <a:endParaRPr lang="en-US"/>
           </a:p>
@@ -846,7 +846,7 @@
           <a:p>
             <a:fld id="{4C707D6F-0D04-EC44-A702-F7C7F0C5C2B0}" type="datetimeFigureOut">
               <a:rPr lang="en-US" smtClean="0"/>
-              <a:t>11/8/17</a:t>
+              <a:t>11/11/17</a:t>
             </a:fld>
             <a:endParaRPr lang="en-US"/>
           </a:p>
@@ -1021,7 +1021,7 @@
           <a:p>
             <a:fld id="{4C707D6F-0D04-EC44-A702-F7C7F0C5C2B0}" type="datetimeFigureOut">
               <a:rPr lang="en-US" smtClean="0"/>
-              <a:t>11/8/17</a:t>
+              <a:t>11/11/17</a:t>
             </a:fld>
             <a:endParaRPr lang="en-US"/>
           </a:p>
@@ -1186,7 +1186,7 @@
           <a:p>
             <a:fld id="{4C707D6F-0D04-EC44-A702-F7C7F0C5C2B0}" type="datetimeFigureOut">
               <a:rPr lang="en-US" smtClean="0"/>
-              <a:t>11/8/17</a:t>
+              <a:t>11/11/17</a:t>
             </a:fld>
             <a:endParaRPr lang="en-US"/>
           </a:p>
@@ -1427,7 +1427,7 @@
           <a:p>
             <a:fld id="{4C707D6F-0D04-EC44-A702-F7C7F0C5C2B0}" type="datetimeFigureOut">
               <a:rPr lang="en-US" smtClean="0"/>
-              <a:t>11/8/17</a:t>
+              <a:t>11/11/17</a:t>
             </a:fld>
             <a:endParaRPr lang="en-US"/>
           </a:p>
@@ -1654,7 +1654,7 @@
           <a:p>
             <a:fld id="{4C707D6F-0D04-EC44-A702-F7C7F0C5C2B0}" type="datetimeFigureOut">
               <a:rPr lang="en-US" smtClean="0"/>
-              <a:t>11/8/17</a:t>
+              <a:t>11/11/17</a:t>
             </a:fld>
             <a:endParaRPr lang="en-US"/>
           </a:p>
@@ -2016,7 +2016,7 @@
           <a:p>
             <a:fld id="{4C707D6F-0D04-EC44-A702-F7C7F0C5C2B0}" type="datetimeFigureOut">
               <a:rPr lang="en-US" smtClean="0"/>
-              <a:t>11/8/17</a:t>
+              <a:t>11/11/17</a:t>
             </a:fld>
             <a:endParaRPr lang="en-US"/>
           </a:p>
@@ -2129,7 +2129,7 @@
           <a:p>
             <a:fld id="{4C707D6F-0D04-EC44-A702-F7C7F0C5C2B0}" type="datetimeFigureOut">
               <a:rPr lang="en-US" smtClean="0"/>
-              <a:t>11/8/17</a:t>
+              <a:t>11/11/17</a:t>
             </a:fld>
             <a:endParaRPr lang="en-US"/>
           </a:p>
@@ -2219,7 +2219,7 @@
           <a:p>
             <a:fld id="{4C707D6F-0D04-EC44-A702-F7C7F0C5C2B0}" type="datetimeFigureOut">
               <a:rPr lang="en-US" smtClean="0"/>
-              <a:t>11/8/17</a:t>
+              <a:t>11/11/17</a:t>
             </a:fld>
             <a:endParaRPr lang="en-US"/>
           </a:p>
@@ -2491,7 +2491,7 @@
           <a:p>
             <a:fld id="{4C707D6F-0D04-EC44-A702-F7C7F0C5C2B0}" type="datetimeFigureOut">
               <a:rPr lang="en-US" smtClean="0"/>
-              <a:t>11/8/17</a:t>
+              <a:t>11/11/17</a:t>
             </a:fld>
             <a:endParaRPr lang="en-US"/>
           </a:p>
@@ -2743,7 +2743,7 @@
           <a:p>
             <a:fld id="{4C707D6F-0D04-EC44-A702-F7C7F0C5C2B0}" type="datetimeFigureOut">
               <a:rPr lang="en-US" smtClean="0"/>
-              <a:t>11/8/17</a:t>
+              <a:t>11/11/17</a:t>
             </a:fld>
             <a:endParaRPr lang="en-US"/>
           </a:p>
@@ -2951,7 +2951,7 @@
           <a:p>
             <a:fld id="{4C707D6F-0D04-EC44-A702-F7C7F0C5C2B0}" type="datetimeFigureOut">
               <a:rPr lang="en-US" smtClean="0"/>
-              <a:t>11/8/17</a:t>
+              <a:t>11/11/17</a:t>
             </a:fld>
             <a:endParaRPr lang="en-US"/>
           </a:p>
@@ -4206,8 +4206,8 @@
         </p:nvSpPr>
         <p:spPr>
           <a:xfrm>
-            <a:off x="9632056" y="2980272"/>
-            <a:ext cx="1385315" cy="400110"/>
+            <a:off x="9555112" y="2980272"/>
+            <a:ext cx="1539204" cy="400110"/>
           </a:xfrm>
           <a:prstGeom prst="rect">
             <a:avLst/>
@@ -4222,35 +4222,23 @@
           <a:p>
             <a:pPr algn="ctr"/>
             <a:r>
+              <a:rPr lang="en-US" sz="1000" dirty="0" smtClean="0"/>
+              <a:t>&lt;&lt;</a:t>
+            </a:r>
+            <a:r>
               <a:rPr lang="en-US" sz="1000" dirty="0" err="1" smtClean="0"/>
-              <a:t>backupAddressBook</a:t>
+              <a:t>BackupRequestEvent</a:t>
             </a:r>
             <a:r>
               <a:rPr lang="en-US" sz="1000" dirty="0" smtClean="0"/>
-              <a:t> </a:t>
+              <a:t>&gt;&gt;</a:t>
             </a:r>
           </a:p>
           <a:p>
             <a:pPr algn="ctr"/>
             <a:r>
               <a:rPr lang="en-US" sz="1000" dirty="0" smtClean="0"/>
-              <a:t>(</a:t>
-            </a:r>
-            <a:r>
-              <a:rPr lang="en-US" sz="1000" dirty="0" err="1" smtClean="0"/>
-              <a:t>addressbook</a:t>
-            </a:r>
-            <a:r>
-              <a:rPr lang="en-US" sz="1000" dirty="0" smtClean="0"/>
-              <a:t>, </a:t>
-            </a:r>
-            <a:r>
-              <a:rPr lang="en-US" sz="1000" dirty="0" err="1" smtClean="0"/>
-              <a:t>filepath</a:t>
-            </a:r>
-            <a:r>
-              <a:rPr lang="en-US" sz="1000" dirty="0" smtClean="0"/>
-              <a:t>)</a:t>
+              <a:t>via Model</a:t>
             </a:r>
             <a:endParaRPr lang="en-US" sz="1000" dirty="0"/>
           </a:p>
@@ -4334,11 +4322,7 @@
           <a:p>
             <a:r>
               <a:rPr lang="en-US" smtClean="0"/>
-              <a:t>Backup </a:t>
-            </a:r>
-            <a:r>
-              <a:rPr lang="en-US" smtClean="0"/>
-              <a:t>Sequence Diagram</a:t>
+              <a:t>Backup Sequence Diagram</a:t>
             </a:r>
             <a:endParaRPr lang="en-US" dirty="0"/>
           </a:p>

</xml_diff>